<commit_message>
V3 release of global app and case studies app
</commit_message>
<xml_diff>
--- a/case_studies_app_V3/www/PTHg_intro.pptx
+++ b/case_studies_app_V3/www/PTHg_intro.pptx
@@ -5,10 +5,15 @@
     <p:sldMasterId id="2147483648" r:id="rId1"/>
   </p:sldMasterIdLst>
   <p:notesMasterIdLst>
-    <p:notesMasterId r:id="rId3"/>
+    <p:notesMasterId r:id="rId8"/>
   </p:notesMasterIdLst>
   <p:sldIdLst>
-    <p:sldId id="256" r:id="rId2"/>
+    <p:sldId id="259" r:id="rId2"/>
+    <p:sldId id="256" r:id="rId3"/>
+    <p:sldId id="260" r:id="rId4"/>
+    <p:sldId id="257" r:id="rId5"/>
+    <p:sldId id="261" r:id="rId6"/>
+    <p:sldId id="258" r:id="rId7"/>
   </p:sldIdLst>
   <p:sldSz cx="12192000" cy="6858000"/>
   <p:notesSz cx="6858000" cy="9144000"/>
@@ -107,6 +112,11 @@
       </a:defRPr>
     </a:lvl9pPr>
   </p:defaultTextStyle>
+  <p:extLst>
+    <p:ext uri="{EFAFB233-063F-42B5-8137-9DF3F51BA10A}">
+      <p15:sldGuideLst xmlns:p15="http://schemas.microsoft.com/office/powerpoint/2012/main"/>
+    </p:ext>
+  </p:extLst>
 </p:presentation>
 </file>
 
@@ -192,7 +202,7 @@
           <a:p>
             <a:fld id="{7BBFB01B-90F4-CD49-BD6B-2BE4A4B0C201}" type="datetimeFigureOut">
               <a:rPr lang="fr-FR" smtClean="0"/>
-              <a:t>12/12/2017</a:t>
+              <a:t>13/12/2017</a:t>
             </a:fld>
             <a:endParaRPr lang="fr-FR"/>
           </a:p>
@@ -525,7 +535,7 @@
           <a:p>
             <a:fld id="{1B28F1D4-A041-654F-A158-9F3E3179B3B8}" type="slidenum">
               <a:rPr lang="fr-FR" smtClean="0"/>
-              <a:t>1</a:t>
+              <a:t>2</a:t>
             </a:fld>
             <a:endParaRPr lang="fr-FR"/>
           </a:p>
@@ -675,7 +685,7 @@
           <a:p>
             <a:fld id="{FED7F278-C104-BE49-B06D-DF7694E4706E}" type="datetimeFigureOut">
               <a:rPr lang="fr-FR" smtClean="0"/>
-              <a:t>12/12/2017</a:t>
+              <a:t>13/12/2017</a:t>
             </a:fld>
             <a:endParaRPr lang="fr-FR"/>
           </a:p>
@@ -845,7 +855,7 @@
           <a:p>
             <a:fld id="{FED7F278-C104-BE49-B06D-DF7694E4706E}" type="datetimeFigureOut">
               <a:rPr lang="fr-FR" smtClean="0"/>
-              <a:t>12/12/2017</a:t>
+              <a:t>13/12/2017</a:t>
             </a:fld>
             <a:endParaRPr lang="fr-FR"/>
           </a:p>
@@ -1025,7 +1035,7 @@
           <a:p>
             <a:fld id="{FED7F278-C104-BE49-B06D-DF7694E4706E}" type="datetimeFigureOut">
               <a:rPr lang="fr-FR" smtClean="0"/>
-              <a:t>12/12/2017</a:t>
+              <a:t>13/12/2017</a:t>
             </a:fld>
             <a:endParaRPr lang="fr-FR"/>
           </a:p>
@@ -1195,7 +1205,7 @@
           <a:p>
             <a:fld id="{FED7F278-C104-BE49-B06D-DF7694E4706E}" type="datetimeFigureOut">
               <a:rPr lang="fr-FR" smtClean="0"/>
-              <a:t>12/12/2017</a:t>
+              <a:t>13/12/2017</a:t>
             </a:fld>
             <a:endParaRPr lang="fr-FR"/>
           </a:p>
@@ -1441,7 +1451,7 @@
           <a:p>
             <a:fld id="{FED7F278-C104-BE49-B06D-DF7694E4706E}" type="datetimeFigureOut">
               <a:rPr lang="fr-FR" smtClean="0"/>
-              <a:t>12/12/2017</a:t>
+              <a:t>13/12/2017</a:t>
             </a:fld>
             <a:endParaRPr lang="fr-FR"/>
           </a:p>
@@ -1673,7 +1683,7 @@
           <a:p>
             <a:fld id="{FED7F278-C104-BE49-B06D-DF7694E4706E}" type="datetimeFigureOut">
               <a:rPr lang="fr-FR" smtClean="0"/>
-              <a:t>12/12/2017</a:t>
+              <a:t>13/12/2017</a:t>
             </a:fld>
             <a:endParaRPr lang="fr-FR"/>
           </a:p>
@@ -2040,7 +2050,7 @@
           <a:p>
             <a:fld id="{FED7F278-C104-BE49-B06D-DF7694E4706E}" type="datetimeFigureOut">
               <a:rPr lang="fr-FR" smtClean="0"/>
-              <a:t>12/12/2017</a:t>
+              <a:t>13/12/2017</a:t>
             </a:fld>
             <a:endParaRPr lang="fr-FR"/>
           </a:p>
@@ -2158,7 +2168,7 @@
           <a:p>
             <a:fld id="{FED7F278-C104-BE49-B06D-DF7694E4706E}" type="datetimeFigureOut">
               <a:rPr lang="fr-FR" smtClean="0"/>
-              <a:t>12/12/2017</a:t>
+              <a:t>13/12/2017</a:t>
             </a:fld>
             <a:endParaRPr lang="fr-FR"/>
           </a:p>
@@ -2253,7 +2263,7 @@
           <a:p>
             <a:fld id="{FED7F278-C104-BE49-B06D-DF7694E4706E}" type="datetimeFigureOut">
               <a:rPr lang="fr-FR" smtClean="0"/>
-              <a:t>12/12/2017</a:t>
+              <a:t>13/12/2017</a:t>
             </a:fld>
             <a:endParaRPr lang="fr-FR"/>
           </a:p>
@@ -2530,7 +2540,7 @@
           <a:p>
             <a:fld id="{FED7F278-C104-BE49-B06D-DF7694E4706E}" type="datetimeFigureOut">
               <a:rPr lang="fr-FR" smtClean="0"/>
-              <a:t>12/12/2017</a:t>
+              <a:t>13/12/2017</a:t>
             </a:fld>
             <a:endParaRPr lang="fr-FR"/>
           </a:p>
@@ -2783,7 +2793,7 @@
           <a:p>
             <a:fld id="{FED7F278-C104-BE49-B06D-DF7694E4706E}" type="datetimeFigureOut">
               <a:rPr lang="fr-FR" smtClean="0"/>
-              <a:t>12/12/2017</a:t>
+              <a:t>13/12/2017</a:t>
             </a:fld>
             <a:endParaRPr lang="fr-FR"/>
           </a:p>
@@ -2996,7 +3006,7 @@
           <a:p>
             <a:fld id="{FED7F278-C104-BE49-B06D-DF7694E4706E}" type="datetimeFigureOut">
               <a:rPr lang="fr-FR" smtClean="0"/>
-              <a:t>12/12/2017</a:t>
+              <a:t>13/12/2017</a:t>
             </a:fld>
             <a:endParaRPr lang="fr-FR"/>
           </a:p>
@@ -3401,6 +3411,74 @@
           <a:chExt cx="0" cy="0"/>
         </a:xfrm>
       </p:grpSpPr>
+      <p:sp>
+        <p:nvSpPr>
+          <p:cNvPr id="2" name="Titre 1"/>
+          <p:cNvSpPr>
+            <a:spLocks noGrp="1"/>
+          </p:cNvSpPr>
+          <p:nvPr>
+            <p:ph type="ctrTitle"/>
+          </p:nvPr>
+        </p:nvSpPr>
+        <p:spPr/>
+        <p:txBody>
+          <a:bodyPr/>
+          <a:lstStyle/>
+          <a:p>
+            <a:r>
+              <a:rPr lang="fr-FR" dirty="0" err="1" smtClean="0"/>
+              <a:t>Overall</a:t>
+            </a:r>
+            <a:r>
+              <a:rPr lang="fr-FR" dirty="0" smtClean="0"/>
+              <a:t> </a:t>
+            </a:r>
+            <a:r>
+              <a:rPr lang="fr-FR" dirty="0" err="1" smtClean="0"/>
+              <a:t>Regulations</a:t>
+            </a:r>
+            <a:endParaRPr lang="fr-FR" dirty="0"/>
+          </a:p>
+        </p:txBody>
+      </p:sp>
+    </p:spTree>
+    <p:extLst>
+      <p:ext uri="{BB962C8B-B14F-4D97-AF65-F5344CB8AC3E}">
+        <p14:creationId xmlns:p14="http://schemas.microsoft.com/office/powerpoint/2010/main" val="1916527600"/>
+      </p:ext>
+    </p:extLst>
+  </p:cSld>
+  <p:clrMapOvr>
+    <a:masterClrMapping/>
+  </p:clrMapOvr>
+  <p:timing>
+    <p:tnLst>
+      <p:par>
+        <p:cTn id="1" dur="indefinite" restart="never" nodeType="tmRoot"/>
+      </p:par>
+    </p:tnLst>
+  </p:timing>
+</p:sld>
+</file>
+
+<file path=ppt/slides/slide2.xml><?xml version="1.0" encoding="utf-8"?>
+<p:sld xmlns:a="http://schemas.openxmlformats.org/drawingml/2006/main" xmlns:r="http://schemas.openxmlformats.org/officeDocument/2006/relationships" xmlns:p="http://schemas.openxmlformats.org/presentationml/2006/main">
+  <p:cSld>
+    <p:spTree>
+      <p:nvGrpSpPr>
+        <p:cNvPr id="1" name=""/>
+        <p:cNvGrpSpPr/>
+        <p:nvPr/>
+      </p:nvGrpSpPr>
+      <p:grpSpPr>
+        <a:xfrm>
+          <a:off x="0" y="0"/>
+          <a:ext cx="0" cy="0"/>
+          <a:chOff x="0" y="0"/>
+          <a:chExt cx="0" cy="0"/>
+        </a:xfrm>
+      </p:grpSpPr>
       <p:pic>
         <p:nvPicPr>
           <p:cNvPr id="97" name="Image 96"/>
@@ -4699,6 +4777,54 @@
           </a:prstGeom>
         </p:spPr>
       </p:pic>
+      <p:sp>
+        <p:nvSpPr>
+          <p:cNvPr id="3" name="Délai  2"/>
+          <p:cNvSpPr/>
+          <p:nvPr/>
+        </p:nvSpPr>
+        <p:spPr>
+          <a:xfrm rot="5400000">
+            <a:off x="3357973" y="150083"/>
+            <a:ext cx="421769" cy="326576"/>
+          </a:xfrm>
+          <a:prstGeom prst="flowChartDelay">
+            <a:avLst/>
+          </a:prstGeom>
+          <a:solidFill>
+            <a:srgbClr val="FFC000"/>
+          </a:solidFill>
+          <a:ln>
+            <a:solidFill>
+              <a:srgbClr val="FFC000"/>
+            </a:solidFill>
+          </a:ln>
+        </p:spPr>
+        <p:style>
+          <a:lnRef idx="2">
+            <a:schemeClr val="accent1">
+              <a:shade val="50000"/>
+            </a:schemeClr>
+          </a:lnRef>
+          <a:fillRef idx="1">
+            <a:schemeClr val="accent1"/>
+          </a:fillRef>
+          <a:effectRef idx="0">
+            <a:schemeClr val="accent1"/>
+          </a:effectRef>
+          <a:fontRef idx="minor">
+            <a:schemeClr val="lt1"/>
+          </a:fontRef>
+        </p:style>
+        <p:txBody>
+          <a:bodyPr rtlCol="0" anchor="ctr"/>
+          <a:lstStyle/>
+          <a:p>
+            <a:pPr algn="ctr"/>
+            <a:endParaRPr lang="fr-FR"/>
+          </a:p>
+        </p:txBody>
+      </p:sp>
     </p:spTree>
     <p:extLst>
       <p:ext uri="{BB962C8B-B14F-4D97-AF65-F5344CB8AC3E}">
@@ -5507,22 +5633,6 @@
                                       </p:tavLst>
                                     </p:anim>
                                   </p:childTnLst>
-                                  <p:subTnLst>
-                                    <p:animClr clrSpc="rgb" dir="cw">
-                                      <p:cBhvr override="childStyle">
-                                        <p:cTn dur="1" fill="hold" display="0" masterRel="nextClick" afterEffect="1"/>
-                                        <p:tgtEl>
-                                          <p:spTgt spid="154"/>
-                                        </p:tgtEl>
-                                        <p:attrNameLst>
-                                          <p:attrName>ppt_c</p:attrName>
-                                        </p:attrNameLst>
-                                      </p:cBhvr>
-                                      <p:to>
-                                        <a:schemeClr val="tx1"/>
-                                      </p:to>
-                                    </p:animClr>
-                                  </p:subTnLst>
                                 </p:cTn>
                               </p:par>
                             </p:childTnLst>
@@ -5618,22 +5728,6 @@
                                       </p:tavLst>
                                     </p:anim>
                                   </p:childTnLst>
-                                  <p:subTnLst>
-                                    <p:animClr clrSpc="rgb" dir="cw">
-                                      <p:cBhvr override="childStyle">
-                                        <p:cTn dur="1" fill="hold" display="0" masterRel="nextClick" afterEffect="1"/>
-                                        <p:tgtEl>
-                                          <p:spTgt spid="132"/>
-                                        </p:tgtEl>
-                                        <p:attrNameLst>
-                                          <p:attrName>ppt_c</p:attrName>
-                                        </p:attrNameLst>
-                                      </p:cBhvr>
-                                      <p:to>
-                                        <a:schemeClr val="tx1"/>
-                                      </p:to>
-                                    </p:animClr>
-                                  </p:subTnLst>
                                 </p:cTn>
                               </p:par>
                             </p:childTnLst>
@@ -5963,22 +6057,6 @@
                                       </p:tavLst>
                                     </p:anim>
                                   </p:childTnLst>
-                                  <p:subTnLst>
-                                    <p:animClr clrSpc="rgb" dir="cw">
-                                      <p:cBhvr override="childStyle">
-                                        <p:cTn dur="1" fill="hold" display="0" masterRel="nextClick" afterEffect="1"/>
-                                        <p:tgtEl>
-                                          <p:spTgt spid="134"/>
-                                        </p:tgtEl>
-                                        <p:attrNameLst>
-                                          <p:attrName>ppt_c</p:attrName>
-                                        </p:attrNameLst>
-                                      </p:cBhvr>
-                                      <p:to>
-                                        <a:schemeClr val="tx1"/>
-                                      </p:to>
-                                    </p:animClr>
-                                  </p:subTnLst>
                                 </p:cTn>
                               </p:par>
                             </p:childTnLst>
@@ -6330,6 +6408,86 @@
                                   </p:childTnLst>
                                 </p:cTn>
                               </p:par>
+                              <p:par>
+                                <p:cTn id="131" presetID="1" presetClass="entr" presetSubtype="0" fill="hold" grpId="0" nodeType="withEffect">
+                                  <p:stCondLst>
+                                    <p:cond delay="10000"/>
+                                  </p:stCondLst>
+                                  <p:childTnLst>
+                                    <p:set>
+                                      <p:cBhvr>
+                                        <p:cTn id="132" dur="1" fill="hold">
+                                          <p:stCondLst>
+                                            <p:cond delay="0"/>
+                                          </p:stCondLst>
+                                        </p:cTn>
+                                        <p:tgtEl>
+                                          <p:spTgt spid="3"/>
+                                        </p:tgtEl>
+                                        <p:attrNameLst>
+                                          <p:attrName>style.visibility</p:attrName>
+                                        </p:attrNameLst>
+                                      </p:cBhvr>
+                                      <p:to>
+                                        <p:strVal val="visible"/>
+                                      </p:to>
+                                    </p:set>
+                                  </p:childTnLst>
+                                </p:cTn>
+                              </p:par>
+                              <p:par>
+                                <p:cTn id="133" presetID="0" presetClass="path" presetSubtype="0" repeatCount="1000000" accel="50000" decel="50000" fill="hold" grpId="1" nodeType="withEffect">
+                                  <p:stCondLst>
+                                    <p:cond delay="11000"/>
+                                  </p:stCondLst>
+                                  <p:childTnLst>
+                                    <p:animMotion origin="layout" path="M 0 0 C -0.00183 0.01852 -0.00365 0.03727 -0.00235 0.05348 C -0.00104 0.06991 0.00338 0.08565 0.00768 0.09769 C 0.01198 0.10949 0.01484 0.12037 0.02317 0.125 C 0.03151 0.12986 0.05807 0.12639 0.05807 0.12639 " pathEditMode="relative" ptsTypes="AAAAA">
+                                      <p:cBhvr>
+                                        <p:cTn id="134" dur="2000" fill="hold"/>
+                                        <p:tgtEl>
+                                          <p:spTgt spid="3"/>
+                                        </p:tgtEl>
+                                        <p:attrNameLst>
+                                          <p:attrName>ppt_x</p:attrName>
+                                          <p:attrName>ppt_y</p:attrName>
+                                        </p:attrNameLst>
+                                      </p:cBhvr>
+                                    </p:animMotion>
+                                  </p:childTnLst>
+                                </p:cTn>
+                              </p:par>
+                              <p:par>
+                                <p:cTn id="135" presetID="35" presetClass="emph" presetSubtype="0" repeatCount="1000000" fill="hold" nodeType="withEffect">
+                                  <p:stCondLst>
+                                    <p:cond delay="12000"/>
+                                  </p:stCondLst>
+                                  <p:childTnLst>
+                                    <p:anim calcmode="discrete" valueType="str">
+                                      <p:cBhvr>
+                                        <p:cTn id="136" dur="1000" fill="hold"/>
+                                        <p:tgtEl>
+                                          <p:spTgt spid="132"/>
+                                        </p:tgtEl>
+                                        <p:attrNameLst>
+                                          <p:attrName>style.visibility</p:attrName>
+                                        </p:attrNameLst>
+                                      </p:cBhvr>
+                                      <p:tavLst>
+                                        <p:tav tm="0">
+                                          <p:val>
+                                            <p:strVal val="hidden"/>
+                                          </p:val>
+                                        </p:tav>
+                                        <p:tav tm="50000">
+                                          <p:val>
+                                            <p:strVal val="visible"/>
+                                          </p:val>
+                                        </p:tav>
+                                      </p:tavLst>
+                                    </p:anim>
+                                  </p:childTnLst>
+                                </p:cTn>
+                              </p:par>
                             </p:childTnLst>
                           </p:cTn>
                         </p:par>
@@ -6372,6 +6530,3210 @@
       <p:bldP spid="150" grpId="0" animBg="1"/>
       <p:bldP spid="151" grpId="0" animBg="1"/>
       <p:bldP spid="152" grpId="0" animBg="1"/>
+      <p:bldP spid="3" grpId="0" animBg="1"/>
+      <p:bldP spid="3" grpId="1" animBg="1"/>
+    </p:bldLst>
+  </p:timing>
+</p:sld>
+</file>
+
+<file path=ppt/slides/slide3.xml><?xml version="1.0" encoding="utf-8"?>
+<p:sld xmlns:a="http://schemas.openxmlformats.org/drawingml/2006/main" xmlns:r="http://schemas.openxmlformats.org/officeDocument/2006/relationships" xmlns:p="http://schemas.openxmlformats.org/presentationml/2006/main">
+  <p:cSld>
+    <p:spTree>
+      <p:nvGrpSpPr>
+        <p:cNvPr id="1" name=""/>
+        <p:cNvGrpSpPr/>
+        <p:nvPr/>
+      </p:nvGrpSpPr>
+      <p:grpSpPr>
+        <a:xfrm>
+          <a:off x="0" y="0"/>
+          <a:ext cx="0" cy="0"/>
+          <a:chOff x="0" y="0"/>
+          <a:chExt cx="0" cy="0"/>
+        </a:xfrm>
+      </p:grpSpPr>
+      <p:sp>
+        <p:nvSpPr>
+          <p:cNvPr id="2" name="Titre 1"/>
+          <p:cNvSpPr>
+            <a:spLocks noGrp="1"/>
+          </p:cNvSpPr>
+          <p:nvPr>
+            <p:ph type="title"/>
+          </p:nvPr>
+        </p:nvSpPr>
+        <p:spPr>
+          <a:xfrm>
+            <a:off x="357752" y="2472895"/>
+            <a:ext cx="12428349" cy="1325563"/>
+          </a:xfrm>
+        </p:spPr>
+        <p:txBody>
+          <a:bodyPr>
+            <a:noAutofit/>
+          </a:bodyPr>
+          <a:lstStyle/>
+          <a:p>
+            <a:r>
+              <a:rPr lang="fr-FR" sz="6000" dirty="0" err="1" smtClean="0"/>
+              <a:t>Hypercalcemia</a:t>
+            </a:r>
+            <a:r>
+              <a:rPr lang="fr-FR" sz="6000" dirty="0" smtClean="0"/>
+              <a:t> </a:t>
+            </a:r>
+            <a:r>
+              <a:rPr lang="fr-FR" sz="6000" dirty="0" err="1" smtClean="0"/>
+              <a:t>inhibits</a:t>
+            </a:r>
+            <a:r>
+              <a:rPr lang="fr-FR" sz="6000" dirty="0" smtClean="0"/>
+              <a:t> PTH </a:t>
+            </a:r>
+            <a:r>
+              <a:rPr lang="fr-FR" sz="6000" dirty="0" err="1" smtClean="0"/>
+              <a:t>secretion</a:t>
+            </a:r>
+            <a:endParaRPr lang="fr-FR" sz="6000" dirty="0"/>
+          </a:p>
+        </p:txBody>
+      </p:sp>
+    </p:spTree>
+    <p:extLst>
+      <p:ext uri="{BB962C8B-B14F-4D97-AF65-F5344CB8AC3E}">
+        <p14:creationId xmlns:p14="http://schemas.microsoft.com/office/powerpoint/2010/main" val="1721150500"/>
+      </p:ext>
+    </p:extLst>
+  </p:cSld>
+  <p:clrMapOvr>
+    <a:masterClrMapping/>
+  </p:clrMapOvr>
+  <p:timing>
+    <p:tnLst>
+      <p:par>
+        <p:cTn id="1" dur="indefinite" restart="never" nodeType="tmRoot"/>
+      </p:par>
+    </p:tnLst>
+  </p:timing>
+</p:sld>
+</file>
+
+<file path=ppt/slides/slide4.xml><?xml version="1.0" encoding="utf-8"?>
+<p:sld xmlns:a="http://schemas.openxmlformats.org/drawingml/2006/main" xmlns:r="http://schemas.openxmlformats.org/officeDocument/2006/relationships" xmlns:p="http://schemas.openxmlformats.org/presentationml/2006/main">
+  <p:cSld>
+    <p:spTree>
+      <p:nvGrpSpPr>
+        <p:cNvPr id="1" name=""/>
+        <p:cNvGrpSpPr/>
+        <p:nvPr/>
+      </p:nvGrpSpPr>
+      <p:grpSpPr>
+        <a:xfrm>
+          <a:off x="0" y="0"/>
+          <a:ext cx="0" cy="0"/>
+          <a:chOff x="0" y="0"/>
+          <a:chExt cx="0" cy="0"/>
+        </a:xfrm>
+      </p:grpSpPr>
+      <p:pic>
+        <p:nvPicPr>
+          <p:cNvPr id="9" name="Image 8"/>
+          <p:cNvPicPr>
+            <a:picLocks noChangeAspect="1"/>
+          </p:cNvPicPr>
+          <p:nvPr/>
+        </p:nvPicPr>
+        <p:blipFill>
+          <a:blip r:embed="rId2">
+            <a:extLst>
+              <a:ext uri="{28A0092B-C50C-407E-A947-70E740481C1C}">
+                <a14:useLocalDpi xmlns:a14="http://schemas.microsoft.com/office/drawing/2010/main" val="0"/>
+              </a:ext>
+            </a:extLst>
+          </a:blip>
+          <a:stretch>
+            <a:fillRect/>
+          </a:stretch>
+        </p:blipFill>
+        <p:spPr>
+          <a:xfrm>
+            <a:off x="2281742" y="-16345"/>
+            <a:ext cx="7679317" cy="6858000"/>
+          </a:xfrm>
+          <a:prstGeom prst="rect">
+            <a:avLst/>
+          </a:prstGeom>
+        </p:spPr>
+      </p:pic>
+      <p:sp>
+        <p:nvSpPr>
+          <p:cNvPr id="10" name="Flèche vers la droite 9"/>
+          <p:cNvSpPr/>
+          <p:nvPr/>
+        </p:nvSpPr>
+        <p:spPr>
+          <a:xfrm>
+            <a:off x="5322417" y="2901026"/>
+            <a:ext cx="1175657" cy="511629"/>
+          </a:xfrm>
+          <a:prstGeom prst="rightArrow">
+            <a:avLst/>
+          </a:prstGeom>
+          <a:solidFill>
+            <a:schemeClr val="tx1"/>
+          </a:solidFill>
+          <a:ln>
+            <a:solidFill>
+              <a:schemeClr val="tx1"/>
+            </a:solidFill>
+          </a:ln>
+        </p:spPr>
+        <p:style>
+          <a:lnRef idx="2">
+            <a:schemeClr val="accent1">
+              <a:shade val="50000"/>
+            </a:schemeClr>
+          </a:lnRef>
+          <a:fillRef idx="1">
+            <a:schemeClr val="accent1"/>
+          </a:fillRef>
+          <a:effectRef idx="0">
+            <a:schemeClr val="accent1"/>
+          </a:effectRef>
+          <a:fontRef idx="minor">
+            <a:schemeClr val="lt1"/>
+          </a:fontRef>
+        </p:style>
+        <p:txBody>
+          <a:bodyPr rtlCol="0" anchor="ctr"/>
+          <a:lstStyle/>
+          <a:p>
+            <a:pPr algn="ctr"/>
+            <a:endParaRPr lang="fr-FR"/>
+          </a:p>
+        </p:txBody>
+      </p:sp>
+      <p:sp>
+        <p:nvSpPr>
+          <p:cNvPr id="11" name="Ellipse 10"/>
+          <p:cNvSpPr/>
+          <p:nvPr/>
+        </p:nvSpPr>
+        <p:spPr>
+          <a:xfrm>
+            <a:off x="6546562" y="2742438"/>
+            <a:ext cx="957942" cy="783770"/>
+          </a:xfrm>
+          <a:prstGeom prst="ellipse">
+            <a:avLst/>
+          </a:prstGeom>
+        </p:spPr>
+        <p:style>
+          <a:lnRef idx="2">
+            <a:schemeClr val="accent1">
+              <a:shade val="50000"/>
+            </a:schemeClr>
+          </a:lnRef>
+          <a:fillRef idx="1">
+            <a:schemeClr val="accent1"/>
+          </a:fillRef>
+          <a:effectRef idx="0">
+            <a:schemeClr val="accent1"/>
+          </a:effectRef>
+          <a:fontRef idx="minor">
+            <a:schemeClr val="lt1"/>
+          </a:fontRef>
+        </p:style>
+        <p:txBody>
+          <a:bodyPr rtlCol="0" anchor="ctr"/>
+          <a:lstStyle/>
+          <a:p>
+            <a:pPr algn="ctr"/>
+            <a:r>
+              <a:rPr lang="fr-FR" dirty="0" err="1" smtClean="0"/>
+              <a:t>PTHg</a:t>
+            </a:r>
+            <a:endParaRPr lang="fr-FR" dirty="0"/>
+          </a:p>
+        </p:txBody>
+      </p:sp>
+      <p:sp>
+        <p:nvSpPr>
+          <p:cNvPr id="12" name="Flèche vers la droite 11"/>
+          <p:cNvSpPr/>
+          <p:nvPr/>
+        </p:nvSpPr>
+        <p:spPr>
+          <a:xfrm>
+            <a:off x="7609030" y="2959381"/>
+            <a:ext cx="1522460" cy="518104"/>
+          </a:xfrm>
+          <a:prstGeom prst="rightArrow">
+            <a:avLst/>
+          </a:prstGeom>
+          <a:solidFill>
+            <a:schemeClr val="tx1"/>
+          </a:solidFill>
+          <a:ln>
+            <a:solidFill>
+              <a:schemeClr val="tx1"/>
+            </a:solidFill>
+          </a:ln>
+        </p:spPr>
+        <p:style>
+          <a:lnRef idx="2">
+            <a:schemeClr val="accent1">
+              <a:shade val="50000"/>
+            </a:schemeClr>
+          </a:lnRef>
+          <a:fillRef idx="1">
+            <a:schemeClr val="accent1"/>
+          </a:fillRef>
+          <a:effectRef idx="0">
+            <a:schemeClr val="accent1"/>
+          </a:effectRef>
+          <a:fontRef idx="minor">
+            <a:schemeClr val="lt1"/>
+          </a:fontRef>
+        </p:style>
+        <p:txBody>
+          <a:bodyPr rtlCol="0" anchor="ctr"/>
+          <a:lstStyle/>
+          <a:p>
+            <a:pPr algn="ctr"/>
+            <a:endParaRPr lang="fr-FR"/>
+          </a:p>
+        </p:txBody>
+      </p:sp>
+      <p:sp>
+        <p:nvSpPr>
+          <p:cNvPr id="13" name="Flèche vers la droite 12"/>
+          <p:cNvSpPr/>
+          <p:nvPr/>
+        </p:nvSpPr>
+        <p:spPr>
+          <a:xfrm rot="5400000">
+            <a:off x="6434265" y="3948824"/>
+            <a:ext cx="1182535" cy="511629"/>
+          </a:xfrm>
+          <a:prstGeom prst="rightArrow">
+            <a:avLst/>
+          </a:prstGeom>
+          <a:solidFill>
+            <a:schemeClr val="tx1"/>
+          </a:solidFill>
+          <a:ln>
+            <a:solidFill>
+              <a:schemeClr val="tx1"/>
+            </a:solidFill>
+          </a:ln>
+        </p:spPr>
+        <p:style>
+          <a:lnRef idx="2">
+            <a:schemeClr val="accent1">
+              <a:shade val="50000"/>
+            </a:schemeClr>
+          </a:lnRef>
+          <a:fillRef idx="1">
+            <a:schemeClr val="accent1"/>
+          </a:fillRef>
+          <a:effectRef idx="0">
+            <a:schemeClr val="accent1"/>
+          </a:effectRef>
+          <a:fontRef idx="minor">
+            <a:schemeClr val="lt1"/>
+          </a:fontRef>
+        </p:style>
+        <p:txBody>
+          <a:bodyPr rtlCol="0" anchor="ctr"/>
+          <a:lstStyle/>
+          <a:p>
+            <a:pPr algn="ctr"/>
+            <a:endParaRPr lang="fr-FR"/>
+          </a:p>
+        </p:txBody>
+      </p:sp>
+      <p:cxnSp>
+        <p:nvCxnSpPr>
+          <p:cNvPr id="14" name="Connecteur droit avec flèche 13"/>
+          <p:cNvCxnSpPr/>
+          <p:nvPr/>
+        </p:nvCxnSpPr>
+        <p:spPr>
+          <a:xfrm>
+            <a:off x="4648344" y="1012999"/>
+            <a:ext cx="1028876" cy="1912028"/>
+          </a:xfrm>
+          <a:prstGeom prst="straightConnector1">
+            <a:avLst/>
+          </a:prstGeom>
+          <a:ln w="63500">
+            <a:solidFill>
+              <a:schemeClr val="tx1"/>
+            </a:solidFill>
+            <a:prstDash val="dash"/>
+            <a:tailEnd type="triangle"/>
+          </a:ln>
+        </p:spPr>
+        <p:style>
+          <a:lnRef idx="1">
+            <a:schemeClr val="accent1"/>
+          </a:lnRef>
+          <a:fillRef idx="0">
+            <a:schemeClr val="accent1"/>
+          </a:fillRef>
+          <a:effectRef idx="0">
+            <a:schemeClr val="accent1"/>
+          </a:effectRef>
+          <a:fontRef idx="minor">
+            <a:schemeClr val="tx1"/>
+          </a:fontRef>
+        </p:style>
+      </p:cxnSp>
+      <p:cxnSp>
+        <p:nvCxnSpPr>
+          <p:cNvPr id="15" name="Connecteur droit avec flèche 14"/>
+          <p:cNvCxnSpPr/>
+          <p:nvPr/>
+        </p:nvCxnSpPr>
+        <p:spPr>
+          <a:xfrm>
+            <a:off x="7590449" y="1606628"/>
+            <a:ext cx="869561" cy="1424034"/>
+          </a:xfrm>
+          <a:prstGeom prst="straightConnector1">
+            <a:avLst/>
+          </a:prstGeom>
+          <a:ln w="276225">
+            <a:solidFill>
+              <a:srgbClr val="FFFF00"/>
+            </a:solidFill>
+            <a:prstDash val="sysDot"/>
+            <a:tailEnd type="triangle"/>
+          </a:ln>
+        </p:spPr>
+        <p:style>
+          <a:lnRef idx="1">
+            <a:schemeClr val="accent1"/>
+          </a:lnRef>
+          <a:fillRef idx="0">
+            <a:schemeClr val="accent1"/>
+          </a:fillRef>
+          <a:effectRef idx="0">
+            <a:schemeClr val="accent1"/>
+          </a:effectRef>
+          <a:fontRef idx="minor">
+            <a:schemeClr val="tx1"/>
+          </a:fontRef>
+        </p:style>
+      </p:cxnSp>
+      <p:pic>
+        <p:nvPicPr>
+          <p:cNvPr id="16" name="Image 15"/>
+          <p:cNvPicPr>
+            <a:picLocks noChangeAspect="1"/>
+          </p:cNvPicPr>
+          <p:nvPr/>
+        </p:nvPicPr>
+        <p:blipFill>
+          <a:blip r:embed="rId3">
+            <a:extLst>
+              <a:ext uri="{28A0092B-C50C-407E-A947-70E740481C1C}">
+                <a14:useLocalDpi xmlns:a14="http://schemas.microsoft.com/office/drawing/2010/main" val="0"/>
+              </a:ext>
+            </a:extLst>
+          </a:blip>
+          <a:stretch>
+            <a:fillRect/>
+          </a:stretch>
+        </p:blipFill>
+        <p:spPr>
+          <a:xfrm>
+            <a:off x="5706028" y="759543"/>
+            <a:ext cx="568567" cy="457198"/>
+          </a:xfrm>
+          <a:prstGeom prst="rect">
+            <a:avLst/>
+          </a:prstGeom>
+        </p:spPr>
+      </p:pic>
+      <p:pic>
+        <p:nvPicPr>
+          <p:cNvPr id="17" name="Image 16"/>
+          <p:cNvPicPr>
+            <a:picLocks noChangeAspect="1"/>
+          </p:cNvPicPr>
+          <p:nvPr/>
+        </p:nvPicPr>
+        <p:blipFill>
+          <a:blip r:embed="rId3">
+            <a:extLst>
+              <a:ext uri="{28A0092B-C50C-407E-A947-70E740481C1C}">
+                <a14:useLocalDpi xmlns:a14="http://schemas.microsoft.com/office/drawing/2010/main" val="0"/>
+              </a:ext>
+            </a:extLst>
+          </a:blip>
+          <a:stretch>
+            <a:fillRect/>
+          </a:stretch>
+        </p:blipFill>
+        <p:spPr>
+          <a:xfrm>
+            <a:off x="6121401" y="645244"/>
+            <a:ext cx="568567" cy="457198"/>
+          </a:xfrm>
+          <a:prstGeom prst="rect">
+            <a:avLst/>
+          </a:prstGeom>
+        </p:spPr>
+      </p:pic>
+      <p:sp>
+        <p:nvSpPr>
+          <p:cNvPr id="21" name="ZoneTexte 20"/>
+          <p:cNvSpPr txBox="1"/>
+          <p:nvPr/>
+        </p:nvSpPr>
+        <p:spPr>
+          <a:xfrm>
+            <a:off x="7210831" y="4035267"/>
+            <a:ext cx="1777072" cy="369332"/>
+          </a:xfrm>
+          <a:prstGeom prst="rect">
+            <a:avLst/>
+          </a:prstGeom>
+          <a:noFill/>
+        </p:spPr>
+        <p:txBody>
+          <a:bodyPr wrap="square" rtlCol="0">
+            <a:spAutoFit/>
+          </a:bodyPr>
+          <a:lstStyle/>
+          <a:p>
+            <a:r>
+              <a:rPr lang="fr-FR" smtClean="0"/>
+              <a:t>degradation</a:t>
+            </a:r>
+            <a:endParaRPr lang="fr-FR" dirty="0"/>
+          </a:p>
+        </p:txBody>
+      </p:sp>
+      <p:sp>
+        <p:nvSpPr>
+          <p:cNvPr id="22" name="ZoneTexte 21"/>
+          <p:cNvSpPr txBox="1"/>
+          <p:nvPr/>
+        </p:nvSpPr>
+        <p:spPr>
+          <a:xfrm>
+            <a:off x="5357251" y="3380167"/>
+            <a:ext cx="1777072" cy="369332"/>
+          </a:xfrm>
+          <a:prstGeom prst="rect">
+            <a:avLst/>
+          </a:prstGeom>
+          <a:noFill/>
+        </p:spPr>
+        <p:txBody>
+          <a:bodyPr wrap="square" rtlCol="0">
+            <a:spAutoFit/>
+          </a:bodyPr>
+          <a:lstStyle/>
+          <a:p>
+            <a:r>
+              <a:rPr lang="fr-FR" dirty="0" err="1" smtClean="0"/>
+              <a:t>synthesis</a:t>
+            </a:r>
+            <a:endParaRPr lang="fr-FR" dirty="0"/>
+          </a:p>
+        </p:txBody>
+      </p:sp>
+      <p:pic>
+        <p:nvPicPr>
+          <p:cNvPr id="23" name="Image 22"/>
+          <p:cNvPicPr>
+            <a:picLocks noChangeAspect="1"/>
+          </p:cNvPicPr>
+          <p:nvPr/>
+        </p:nvPicPr>
+        <p:blipFill>
+          <a:blip r:embed="rId4">
+            <a:extLst>
+              <a:ext uri="{28A0092B-C50C-407E-A947-70E740481C1C}">
+                <a14:useLocalDpi xmlns:a14="http://schemas.microsoft.com/office/drawing/2010/main" val="0"/>
+              </a:ext>
+            </a:extLst>
+          </a:blip>
+          <a:stretch>
+            <a:fillRect/>
+          </a:stretch>
+        </p:blipFill>
+        <p:spPr>
+          <a:xfrm>
+            <a:off x="7324187" y="814898"/>
+            <a:ext cx="609600" cy="520700"/>
+          </a:xfrm>
+          <a:prstGeom prst="rect">
+            <a:avLst/>
+          </a:prstGeom>
+        </p:spPr>
+      </p:pic>
+      <p:pic>
+        <p:nvPicPr>
+          <p:cNvPr id="24" name="Image 23"/>
+          <p:cNvPicPr>
+            <a:picLocks noChangeAspect="1"/>
+          </p:cNvPicPr>
+          <p:nvPr/>
+        </p:nvPicPr>
+        <p:blipFill>
+          <a:blip r:embed="rId4">
+            <a:extLst>
+              <a:ext uri="{28A0092B-C50C-407E-A947-70E740481C1C}">
+                <a14:useLocalDpi xmlns:a14="http://schemas.microsoft.com/office/drawing/2010/main" val="0"/>
+              </a:ext>
+            </a:extLst>
+          </a:blip>
+          <a:stretch>
+            <a:fillRect/>
+          </a:stretch>
+        </p:blipFill>
+        <p:spPr>
+          <a:xfrm>
+            <a:off x="7665603" y="933750"/>
+            <a:ext cx="609600" cy="520700"/>
+          </a:xfrm>
+          <a:prstGeom prst="rect">
+            <a:avLst/>
+          </a:prstGeom>
+        </p:spPr>
+      </p:pic>
+      <p:pic>
+        <p:nvPicPr>
+          <p:cNvPr id="25" name="Image 24"/>
+          <p:cNvPicPr>
+            <a:picLocks noChangeAspect="1"/>
+          </p:cNvPicPr>
+          <p:nvPr/>
+        </p:nvPicPr>
+        <p:blipFill>
+          <a:blip r:embed="rId4">
+            <a:extLst>
+              <a:ext uri="{28A0092B-C50C-407E-A947-70E740481C1C}">
+                <a14:useLocalDpi xmlns:a14="http://schemas.microsoft.com/office/drawing/2010/main" val="0"/>
+              </a:ext>
+            </a:extLst>
+          </a:blip>
+          <a:stretch>
+            <a:fillRect/>
+          </a:stretch>
+        </p:blipFill>
+        <p:spPr>
+          <a:xfrm>
+            <a:off x="7601313" y="1189330"/>
+            <a:ext cx="609600" cy="520700"/>
+          </a:xfrm>
+          <a:prstGeom prst="rect">
+            <a:avLst/>
+          </a:prstGeom>
+        </p:spPr>
+      </p:pic>
+      <p:sp>
+        <p:nvSpPr>
+          <p:cNvPr id="26" name="ZoneTexte 25"/>
+          <p:cNvSpPr txBox="1"/>
+          <p:nvPr/>
+        </p:nvSpPr>
+        <p:spPr>
+          <a:xfrm>
+            <a:off x="9650867" y="3140139"/>
+            <a:ext cx="1777072" cy="369332"/>
+          </a:xfrm>
+          <a:prstGeom prst="rect">
+            <a:avLst/>
+          </a:prstGeom>
+          <a:noFill/>
+        </p:spPr>
+        <p:txBody>
+          <a:bodyPr wrap="square" rtlCol="0">
+            <a:spAutoFit/>
+          </a:bodyPr>
+          <a:lstStyle/>
+          <a:p>
+            <a:r>
+              <a:rPr lang="fr-FR" smtClean="0"/>
+              <a:t>exocytosis</a:t>
+            </a:r>
+            <a:endParaRPr lang="fr-FR" dirty="0"/>
+          </a:p>
+        </p:txBody>
+      </p:sp>
+      <p:sp>
+        <p:nvSpPr>
+          <p:cNvPr id="29" name="Rectangle 28"/>
+          <p:cNvSpPr/>
+          <p:nvPr/>
+        </p:nvSpPr>
+        <p:spPr>
+          <a:xfrm>
+            <a:off x="8840602" y="4306529"/>
+            <a:ext cx="3070009" cy="1015015"/>
+          </a:xfrm>
+          <a:prstGeom prst="rect">
+            <a:avLst/>
+          </a:prstGeom>
+        </p:spPr>
+        <p:style>
+          <a:lnRef idx="2">
+            <a:schemeClr val="accent1">
+              <a:shade val="50000"/>
+            </a:schemeClr>
+          </a:lnRef>
+          <a:fillRef idx="1">
+            <a:schemeClr val="accent1"/>
+          </a:fillRef>
+          <a:effectRef idx="0">
+            <a:schemeClr val="accent1"/>
+          </a:effectRef>
+          <a:fontRef idx="minor">
+            <a:schemeClr val="lt1"/>
+          </a:fontRef>
+        </p:style>
+        <p:txBody>
+          <a:bodyPr rtlCol="0" anchor="ctr"/>
+          <a:lstStyle/>
+          <a:p>
+            <a:pPr algn="ctr"/>
+            <a:r>
+              <a:rPr lang="fr-FR" dirty="0" err="1" smtClean="0"/>
+              <a:t>Hypercalcemia</a:t>
+            </a:r>
+            <a:r>
+              <a:rPr lang="fr-FR" dirty="0" smtClean="0"/>
+              <a:t> </a:t>
+            </a:r>
+            <a:r>
+              <a:rPr lang="fr-FR" dirty="0" err="1" smtClean="0"/>
+              <a:t>decreases</a:t>
+            </a:r>
+            <a:r>
+              <a:rPr lang="fr-FR" dirty="0" smtClean="0"/>
+              <a:t> PTH </a:t>
+            </a:r>
+            <a:r>
+              <a:rPr lang="fr-FR" dirty="0" err="1" smtClean="0"/>
+              <a:t>secretion</a:t>
+            </a:r>
+            <a:endParaRPr lang="fr-FR" dirty="0"/>
+          </a:p>
+        </p:txBody>
+      </p:sp>
+      <p:cxnSp>
+        <p:nvCxnSpPr>
+          <p:cNvPr id="30" name="Connecteur droit avec flèche 29"/>
+          <p:cNvCxnSpPr/>
+          <p:nvPr/>
+        </p:nvCxnSpPr>
+        <p:spPr>
+          <a:xfrm flipH="1">
+            <a:off x="5997015" y="1099713"/>
+            <a:ext cx="248772" cy="1847011"/>
+          </a:xfrm>
+          <a:prstGeom prst="straightConnector1">
+            <a:avLst/>
+          </a:prstGeom>
+          <a:ln w="63500">
+            <a:solidFill>
+              <a:schemeClr val="tx1"/>
+            </a:solidFill>
+            <a:prstDash val="dash"/>
+            <a:tailEnd type="triangle"/>
+          </a:ln>
+        </p:spPr>
+        <p:style>
+          <a:lnRef idx="1">
+            <a:schemeClr val="accent1"/>
+          </a:lnRef>
+          <a:fillRef idx="0">
+            <a:schemeClr val="accent1"/>
+          </a:fillRef>
+          <a:effectRef idx="0">
+            <a:schemeClr val="accent1"/>
+          </a:effectRef>
+          <a:fontRef idx="minor">
+            <a:schemeClr val="tx1"/>
+          </a:fontRef>
+        </p:style>
+      </p:cxnSp>
+      <p:pic>
+        <p:nvPicPr>
+          <p:cNvPr id="31" name="Image 30"/>
+          <p:cNvPicPr>
+            <a:picLocks noChangeAspect="1"/>
+          </p:cNvPicPr>
+          <p:nvPr/>
+        </p:nvPicPr>
+        <p:blipFill>
+          <a:blip r:embed="rId5">
+            <a:extLst>
+              <a:ext uri="{28A0092B-C50C-407E-A947-70E740481C1C}">
+                <a14:useLocalDpi xmlns:a14="http://schemas.microsoft.com/office/drawing/2010/main" val="0"/>
+              </a:ext>
+            </a:extLst>
+          </a:blip>
+          <a:stretch>
+            <a:fillRect/>
+          </a:stretch>
+        </p:blipFill>
+        <p:spPr>
+          <a:xfrm>
+            <a:off x="5168554" y="2919960"/>
+            <a:ext cx="500796" cy="484208"/>
+          </a:xfrm>
+          <a:prstGeom prst="rect">
+            <a:avLst/>
+          </a:prstGeom>
+        </p:spPr>
+      </p:pic>
+      <p:pic>
+        <p:nvPicPr>
+          <p:cNvPr id="34" name="Image 33"/>
+          <p:cNvPicPr>
+            <a:picLocks noChangeAspect="1"/>
+          </p:cNvPicPr>
+          <p:nvPr/>
+        </p:nvPicPr>
+        <p:blipFill>
+          <a:blip r:embed="rId4">
+            <a:extLst>
+              <a:ext uri="{28A0092B-C50C-407E-A947-70E740481C1C}">
+                <a14:useLocalDpi xmlns:a14="http://schemas.microsoft.com/office/drawing/2010/main" val="0"/>
+              </a:ext>
+            </a:extLst>
+          </a:blip>
+          <a:stretch>
+            <a:fillRect/>
+          </a:stretch>
+        </p:blipFill>
+        <p:spPr>
+          <a:xfrm>
+            <a:off x="7011641" y="793465"/>
+            <a:ext cx="609600" cy="520700"/>
+          </a:xfrm>
+          <a:prstGeom prst="rect">
+            <a:avLst/>
+          </a:prstGeom>
+        </p:spPr>
+      </p:pic>
+      <p:pic>
+        <p:nvPicPr>
+          <p:cNvPr id="35" name="Image 34"/>
+          <p:cNvPicPr>
+            <a:picLocks noChangeAspect="1"/>
+          </p:cNvPicPr>
+          <p:nvPr/>
+        </p:nvPicPr>
+        <p:blipFill>
+          <a:blip r:embed="rId4">
+            <a:extLst>
+              <a:ext uri="{28A0092B-C50C-407E-A947-70E740481C1C}">
+                <a14:useLocalDpi xmlns:a14="http://schemas.microsoft.com/office/drawing/2010/main" val="0"/>
+              </a:ext>
+            </a:extLst>
+          </a:blip>
+          <a:stretch>
+            <a:fillRect/>
+          </a:stretch>
+        </p:blipFill>
+        <p:spPr>
+          <a:xfrm>
+            <a:off x="9328248" y="416049"/>
+            <a:ext cx="609600" cy="520700"/>
+          </a:xfrm>
+          <a:prstGeom prst="rect">
+            <a:avLst/>
+          </a:prstGeom>
+        </p:spPr>
+      </p:pic>
+      <p:pic>
+        <p:nvPicPr>
+          <p:cNvPr id="36" name="Image 35"/>
+          <p:cNvPicPr>
+            <a:picLocks noChangeAspect="1"/>
+          </p:cNvPicPr>
+          <p:nvPr/>
+        </p:nvPicPr>
+        <p:blipFill>
+          <a:blip r:embed="rId3">
+            <a:extLst>
+              <a:ext uri="{28A0092B-C50C-407E-A947-70E740481C1C}">
+                <a14:useLocalDpi xmlns:a14="http://schemas.microsoft.com/office/drawing/2010/main" val="0"/>
+              </a:ext>
+            </a:extLst>
+          </a:blip>
+          <a:stretch>
+            <a:fillRect/>
+          </a:stretch>
+        </p:blipFill>
+        <p:spPr>
+          <a:xfrm>
+            <a:off x="8883500" y="-22564"/>
+            <a:ext cx="568567" cy="457198"/>
+          </a:xfrm>
+          <a:prstGeom prst="rect">
+            <a:avLst/>
+          </a:prstGeom>
+        </p:spPr>
+      </p:pic>
+      <p:pic>
+        <p:nvPicPr>
+          <p:cNvPr id="37" name="Image 36"/>
+          <p:cNvPicPr>
+            <a:picLocks noChangeAspect="1"/>
+          </p:cNvPicPr>
+          <p:nvPr/>
+        </p:nvPicPr>
+        <p:blipFill>
+          <a:blip r:embed="rId5">
+            <a:extLst>
+              <a:ext uri="{28A0092B-C50C-407E-A947-70E740481C1C}">
+                <a14:useLocalDpi xmlns:a14="http://schemas.microsoft.com/office/drawing/2010/main" val="0"/>
+              </a:ext>
+            </a:extLst>
+          </a:blip>
+          <a:stretch>
+            <a:fillRect/>
+          </a:stretch>
+        </p:blipFill>
+        <p:spPr>
+          <a:xfrm>
+            <a:off x="6801930" y="2910493"/>
+            <a:ext cx="500796" cy="484208"/>
+          </a:xfrm>
+          <a:prstGeom prst="rect">
+            <a:avLst/>
+          </a:prstGeom>
+        </p:spPr>
+      </p:pic>
+      <p:pic>
+        <p:nvPicPr>
+          <p:cNvPr id="38" name="Image 37"/>
+          <p:cNvPicPr>
+            <a:picLocks noChangeAspect="1"/>
+          </p:cNvPicPr>
+          <p:nvPr/>
+        </p:nvPicPr>
+        <p:blipFill>
+          <a:blip r:embed="rId4">
+            <a:extLst>
+              <a:ext uri="{28A0092B-C50C-407E-A947-70E740481C1C}">
+                <a14:useLocalDpi xmlns:a14="http://schemas.microsoft.com/office/drawing/2010/main" val="0"/>
+              </a:ext>
+            </a:extLst>
+          </a:blip>
+          <a:stretch>
+            <a:fillRect/>
+          </a:stretch>
+        </p:blipFill>
+        <p:spPr>
+          <a:xfrm>
+            <a:off x="8768952" y="659608"/>
+            <a:ext cx="609600" cy="520700"/>
+          </a:xfrm>
+          <a:prstGeom prst="rect">
+            <a:avLst/>
+          </a:prstGeom>
+        </p:spPr>
+      </p:pic>
+      <p:pic>
+        <p:nvPicPr>
+          <p:cNvPr id="39" name="Image 38"/>
+          <p:cNvPicPr>
+            <a:picLocks noChangeAspect="1"/>
+          </p:cNvPicPr>
+          <p:nvPr/>
+        </p:nvPicPr>
+        <p:blipFill>
+          <a:blip r:embed="rId4">
+            <a:extLst>
+              <a:ext uri="{28A0092B-C50C-407E-A947-70E740481C1C}">
+                <a14:useLocalDpi xmlns:a14="http://schemas.microsoft.com/office/drawing/2010/main" val="0"/>
+              </a:ext>
+            </a:extLst>
+          </a:blip>
+          <a:stretch>
+            <a:fillRect/>
+          </a:stretch>
+        </p:blipFill>
+        <p:spPr>
+          <a:xfrm>
+            <a:off x="9226097" y="1156598"/>
+            <a:ext cx="609600" cy="520700"/>
+          </a:xfrm>
+          <a:prstGeom prst="rect">
+            <a:avLst/>
+          </a:prstGeom>
+        </p:spPr>
+      </p:pic>
+      <p:pic>
+        <p:nvPicPr>
+          <p:cNvPr id="40" name="Image 39"/>
+          <p:cNvPicPr>
+            <a:picLocks noChangeAspect="1"/>
+          </p:cNvPicPr>
+          <p:nvPr/>
+        </p:nvPicPr>
+        <p:blipFill>
+          <a:blip r:embed="rId4">
+            <a:extLst>
+              <a:ext uri="{28A0092B-C50C-407E-A947-70E740481C1C}">
+                <a14:useLocalDpi xmlns:a14="http://schemas.microsoft.com/office/drawing/2010/main" val="0"/>
+              </a:ext>
+            </a:extLst>
+          </a:blip>
+          <a:stretch>
+            <a:fillRect/>
+          </a:stretch>
+        </p:blipFill>
+        <p:spPr>
+          <a:xfrm>
+            <a:off x="8683103" y="1079100"/>
+            <a:ext cx="609600" cy="520700"/>
+          </a:xfrm>
+          <a:prstGeom prst="rect">
+            <a:avLst/>
+          </a:prstGeom>
+        </p:spPr>
+      </p:pic>
+      <p:sp>
+        <p:nvSpPr>
+          <p:cNvPr id="41" name="ZoneTexte 40"/>
+          <p:cNvSpPr txBox="1"/>
+          <p:nvPr/>
+        </p:nvSpPr>
+        <p:spPr>
+          <a:xfrm>
+            <a:off x="9646488" y="829097"/>
+            <a:ext cx="2488823" cy="523220"/>
+          </a:xfrm>
+          <a:prstGeom prst="rect">
+            <a:avLst/>
+          </a:prstGeom>
+          <a:noFill/>
+        </p:spPr>
+        <p:txBody>
+          <a:bodyPr wrap="square" rtlCol="0">
+            <a:spAutoFit/>
+          </a:bodyPr>
+          <a:lstStyle/>
+          <a:p>
+            <a:r>
+              <a:rPr lang="fr-FR" sz="2800" b="1" dirty="0" err="1" smtClean="0">
+                <a:solidFill>
+                  <a:srgbClr val="FF0000"/>
+                </a:solidFill>
+              </a:rPr>
+              <a:t>hypercalcemia</a:t>
+            </a:r>
+            <a:endParaRPr lang="fr-FR" b="1" dirty="0">
+              <a:solidFill>
+                <a:srgbClr val="FF0000"/>
+              </a:solidFill>
+            </a:endParaRPr>
+          </a:p>
+        </p:txBody>
+      </p:sp>
+      <p:pic>
+        <p:nvPicPr>
+          <p:cNvPr id="43" name="Image 42"/>
+          <p:cNvPicPr>
+            <a:picLocks noChangeAspect="1"/>
+          </p:cNvPicPr>
+          <p:nvPr/>
+        </p:nvPicPr>
+        <p:blipFill>
+          <a:blip r:embed="rId5">
+            <a:extLst>
+              <a:ext uri="{28A0092B-C50C-407E-A947-70E740481C1C}">
+                <a14:useLocalDpi xmlns:a14="http://schemas.microsoft.com/office/drawing/2010/main" val="0"/>
+              </a:ext>
+            </a:extLst>
+          </a:blip>
+          <a:stretch>
+            <a:fillRect/>
+          </a:stretch>
+        </p:blipFill>
+        <p:spPr>
+          <a:xfrm>
+            <a:off x="6786992" y="2895959"/>
+            <a:ext cx="500796" cy="484208"/>
+          </a:xfrm>
+          <a:prstGeom prst="rect">
+            <a:avLst/>
+          </a:prstGeom>
+        </p:spPr>
+      </p:pic>
+    </p:spTree>
+    <p:extLst>
+      <p:ext uri="{BB962C8B-B14F-4D97-AF65-F5344CB8AC3E}">
+        <p14:creationId xmlns:p14="http://schemas.microsoft.com/office/powerpoint/2010/main" val="1531516843"/>
+      </p:ext>
+    </p:extLst>
+  </p:cSld>
+  <p:clrMapOvr>
+    <a:masterClrMapping/>
+  </p:clrMapOvr>
+  <p:timing>
+    <p:tnLst>
+      <p:par>
+        <p:cTn id="1" dur="indefinite" restart="never" nodeType="tmRoot">
+          <p:childTnLst>
+            <p:seq concurrent="1" nextAc="seek">
+              <p:cTn id="2" dur="indefinite" nodeType="mainSeq">
+                <p:childTnLst>
+                  <p:par>
+                    <p:cTn id="3" fill="hold">
+                      <p:stCondLst>
+                        <p:cond delay="indefinite"/>
+                      </p:stCondLst>
+                      <p:childTnLst>
+                        <p:par>
+                          <p:cTn id="4" fill="hold">
+                            <p:stCondLst>
+                              <p:cond delay="0"/>
+                            </p:stCondLst>
+                            <p:childTnLst>
+                              <p:par>
+                                <p:cTn id="5" presetID="1" presetClass="entr" presetSubtype="0" fill="hold" grpId="1" nodeType="clickEffect">
+                                  <p:stCondLst>
+                                    <p:cond delay="0"/>
+                                  </p:stCondLst>
+                                  <p:childTnLst>
+                                    <p:set>
+                                      <p:cBhvr>
+                                        <p:cTn id="6" dur="1" fill="hold">
+                                          <p:stCondLst>
+                                            <p:cond delay="0"/>
+                                          </p:stCondLst>
+                                        </p:cTn>
+                                        <p:tgtEl>
+                                          <p:spTgt spid="41"/>
+                                        </p:tgtEl>
+                                        <p:attrNameLst>
+                                          <p:attrName>style.visibility</p:attrName>
+                                        </p:attrNameLst>
+                                      </p:cBhvr>
+                                      <p:to>
+                                        <p:strVal val="visible"/>
+                                      </p:to>
+                                    </p:set>
+                                  </p:childTnLst>
+                                </p:cTn>
+                              </p:par>
+                              <p:par>
+                                <p:cTn id="7" presetID="35" presetClass="emph" presetSubtype="0" repeatCount="1000000" fill="hold" grpId="0" nodeType="withEffect">
+                                  <p:stCondLst>
+                                    <p:cond delay="1000"/>
+                                  </p:stCondLst>
+                                  <p:childTnLst>
+                                    <p:anim calcmode="discrete" valueType="str">
+                                      <p:cBhvr>
+                                        <p:cTn id="8" dur="1000" fill="hold"/>
+                                        <p:tgtEl>
+                                          <p:spTgt spid="41"/>
+                                        </p:tgtEl>
+                                        <p:attrNameLst>
+                                          <p:attrName>style.visibility</p:attrName>
+                                        </p:attrNameLst>
+                                      </p:cBhvr>
+                                      <p:tavLst>
+                                        <p:tav tm="0">
+                                          <p:val>
+                                            <p:strVal val="hidden"/>
+                                          </p:val>
+                                        </p:tav>
+                                        <p:tav tm="50000">
+                                          <p:val>
+                                            <p:strVal val="visible"/>
+                                          </p:val>
+                                        </p:tav>
+                                      </p:tavLst>
+                                    </p:anim>
+                                  </p:childTnLst>
+                                </p:cTn>
+                              </p:par>
+                              <p:par>
+                                <p:cTn id="9" presetID="1" presetClass="entr" presetSubtype="0" fill="hold" nodeType="withEffect">
+                                  <p:stCondLst>
+                                    <p:cond delay="2000"/>
+                                  </p:stCondLst>
+                                  <p:childTnLst>
+                                    <p:set>
+                                      <p:cBhvr>
+                                        <p:cTn id="10" dur="1" fill="hold">
+                                          <p:stCondLst>
+                                            <p:cond delay="0"/>
+                                          </p:stCondLst>
+                                        </p:cTn>
+                                        <p:tgtEl>
+                                          <p:spTgt spid="35"/>
+                                        </p:tgtEl>
+                                        <p:attrNameLst>
+                                          <p:attrName>style.visibility</p:attrName>
+                                        </p:attrNameLst>
+                                      </p:cBhvr>
+                                      <p:to>
+                                        <p:strVal val="visible"/>
+                                      </p:to>
+                                    </p:set>
+                                  </p:childTnLst>
+                                </p:cTn>
+                              </p:par>
+                              <p:par>
+                                <p:cTn id="11" presetID="1" presetClass="entr" presetSubtype="0" fill="hold" nodeType="withEffect">
+                                  <p:stCondLst>
+                                    <p:cond delay="3000"/>
+                                  </p:stCondLst>
+                                  <p:childTnLst>
+                                    <p:set>
+                                      <p:cBhvr>
+                                        <p:cTn id="12" dur="1" fill="hold">
+                                          <p:stCondLst>
+                                            <p:cond delay="0"/>
+                                          </p:stCondLst>
+                                        </p:cTn>
+                                        <p:tgtEl>
+                                          <p:spTgt spid="38"/>
+                                        </p:tgtEl>
+                                        <p:attrNameLst>
+                                          <p:attrName>style.visibility</p:attrName>
+                                        </p:attrNameLst>
+                                      </p:cBhvr>
+                                      <p:to>
+                                        <p:strVal val="visible"/>
+                                      </p:to>
+                                    </p:set>
+                                  </p:childTnLst>
+                                </p:cTn>
+                              </p:par>
+                              <p:par>
+                                <p:cTn id="13" presetID="1" presetClass="entr" presetSubtype="0" fill="hold" nodeType="withEffect">
+                                  <p:stCondLst>
+                                    <p:cond delay="4000"/>
+                                  </p:stCondLst>
+                                  <p:childTnLst>
+                                    <p:set>
+                                      <p:cBhvr>
+                                        <p:cTn id="14" dur="1" fill="hold">
+                                          <p:stCondLst>
+                                            <p:cond delay="0"/>
+                                          </p:stCondLst>
+                                        </p:cTn>
+                                        <p:tgtEl>
+                                          <p:spTgt spid="40"/>
+                                        </p:tgtEl>
+                                        <p:attrNameLst>
+                                          <p:attrName>style.visibility</p:attrName>
+                                        </p:attrNameLst>
+                                      </p:cBhvr>
+                                      <p:to>
+                                        <p:strVal val="visible"/>
+                                      </p:to>
+                                    </p:set>
+                                  </p:childTnLst>
+                                </p:cTn>
+                              </p:par>
+                              <p:par>
+                                <p:cTn id="15" presetID="1" presetClass="entr" presetSubtype="0" fill="hold" nodeType="withEffect">
+                                  <p:stCondLst>
+                                    <p:cond delay="5000"/>
+                                  </p:stCondLst>
+                                  <p:childTnLst>
+                                    <p:set>
+                                      <p:cBhvr>
+                                        <p:cTn id="16" dur="1" fill="hold">
+                                          <p:stCondLst>
+                                            <p:cond delay="0"/>
+                                          </p:stCondLst>
+                                        </p:cTn>
+                                        <p:tgtEl>
+                                          <p:spTgt spid="39"/>
+                                        </p:tgtEl>
+                                        <p:attrNameLst>
+                                          <p:attrName>style.visibility</p:attrName>
+                                        </p:attrNameLst>
+                                      </p:cBhvr>
+                                      <p:to>
+                                        <p:strVal val="visible"/>
+                                      </p:to>
+                                    </p:set>
+                                  </p:childTnLst>
+                                </p:cTn>
+                              </p:par>
+                              <p:par>
+                                <p:cTn id="17" presetID="0" presetClass="path" presetSubtype="0" repeatCount="1000000" accel="50000" decel="50000" fill="hold" nodeType="withEffect">
+                                  <p:stCondLst>
+                                    <p:cond delay="6000"/>
+                                  </p:stCondLst>
+                                  <p:childTnLst>
+                                    <p:animMotion origin="layout" path="M 3.125E-6 -4.44444E-6 C -0.0086 -0.00555 -0.01706 -0.01111 -0.028 -0.01111 C -0.03906 -0.01111 -0.05235 -0.00717 -0.06615 -4.44444E-6 C -0.07995 0.00718 -0.1013 0.02223 -0.11068 0.03172 C -0.11992 0.04121 -0.12201 0.05672 -0.12201 0.05672 " pathEditMode="relative" ptsTypes="AAAAA">
+                                      <p:cBhvr>
+                                        <p:cTn id="18" dur="2000" fill="hold"/>
+                                        <p:tgtEl>
+                                          <p:spTgt spid="38"/>
+                                        </p:tgtEl>
+                                        <p:attrNameLst>
+                                          <p:attrName>ppt_x</p:attrName>
+                                          <p:attrName>ppt_y</p:attrName>
+                                        </p:attrNameLst>
+                                      </p:cBhvr>
+                                    </p:animMotion>
+                                  </p:childTnLst>
+                                </p:cTn>
+                              </p:par>
+                              <p:par>
+                                <p:cTn id="19" presetID="1" presetClass="entr" presetSubtype="0" fill="hold" nodeType="withEffect">
+                                  <p:stCondLst>
+                                    <p:cond delay="7000"/>
+                                  </p:stCondLst>
+                                  <p:childTnLst>
+                                    <p:set>
+                                      <p:cBhvr>
+                                        <p:cTn id="20" dur="1" fill="hold">
+                                          <p:stCondLst>
+                                            <p:cond delay="0"/>
+                                          </p:stCondLst>
+                                        </p:cTn>
+                                        <p:tgtEl>
+                                          <p:spTgt spid="15"/>
+                                        </p:tgtEl>
+                                        <p:attrNameLst>
+                                          <p:attrName>style.visibility</p:attrName>
+                                        </p:attrNameLst>
+                                      </p:cBhvr>
+                                      <p:to>
+                                        <p:strVal val="visible"/>
+                                      </p:to>
+                                    </p:set>
+                                  </p:childTnLst>
+                                </p:cTn>
+                              </p:par>
+                              <p:par>
+                                <p:cTn id="21" presetID="35" presetClass="emph" presetSubtype="0" repeatCount="1000000" fill="hold" nodeType="withEffect">
+                                  <p:stCondLst>
+                                    <p:cond delay="8000"/>
+                                  </p:stCondLst>
+                                  <p:childTnLst>
+                                    <p:anim calcmode="discrete" valueType="str">
+                                      <p:cBhvr>
+                                        <p:cTn id="22" dur="1000" fill="hold"/>
+                                        <p:tgtEl>
+                                          <p:spTgt spid="15"/>
+                                        </p:tgtEl>
+                                        <p:attrNameLst>
+                                          <p:attrName>style.visibility</p:attrName>
+                                        </p:attrNameLst>
+                                      </p:cBhvr>
+                                      <p:tavLst>
+                                        <p:tav tm="0">
+                                          <p:val>
+                                            <p:strVal val="hidden"/>
+                                          </p:val>
+                                        </p:tav>
+                                        <p:tav tm="50000">
+                                          <p:val>
+                                            <p:strVal val="visible"/>
+                                          </p:val>
+                                        </p:tav>
+                                      </p:tavLst>
+                                    </p:anim>
+                                  </p:childTnLst>
+                                </p:cTn>
+                              </p:par>
+                              <p:par>
+                                <p:cTn id="23" presetID="1" presetClass="entr" presetSubtype="0" fill="hold" nodeType="withEffect">
+                                  <p:stCondLst>
+                                    <p:cond delay="9000"/>
+                                  </p:stCondLst>
+                                  <p:childTnLst>
+                                    <p:set>
+                                      <p:cBhvr>
+                                        <p:cTn id="24" dur="1" fill="hold">
+                                          <p:stCondLst>
+                                            <p:cond delay="0"/>
+                                          </p:stCondLst>
+                                        </p:cTn>
+                                        <p:tgtEl>
+                                          <p:spTgt spid="34"/>
+                                        </p:tgtEl>
+                                        <p:attrNameLst>
+                                          <p:attrName>style.visibility</p:attrName>
+                                        </p:attrNameLst>
+                                      </p:cBhvr>
+                                      <p:to>
+                                        <p:strVal val="visible"/>
+                                      </p:to>
+                                    </p:set>
+                                  </p:childTnLst>
+                                </p:cTn>
+                              </p:par>
+                              <p:par>
+                                <p:cTn id="25" presetID="1" presetClass="entr" presetSubtype="0" fill="hold" nodeType="withEffect">
+                                  <p:stCondLst>
+                                    <p:cond delay="10000"/>
+                                  </p:stCondLst>
+                                  <p:childTnLst>
+                                    <p:set>
+                                      <p:cBhvr>
+                                        <p:cTn id="26" dur="1" fill="hold">
+                                          <p:stCondLst>
+                                            <p:cond delay="0"/>
+                                          </p:stCondLst>
+                                        </p:cTn>
+                                        <p:tgtEl>
+                                          <p:spTgt spid="23"/>
+                                        </p:tgtEl>
+                                        <p:attrNameLst>
+                                          <p:attrName>style.visibility</p:attrName>
+                                        </p:attrNameLst>
+                                      </p:cBhvr>
+                                      <p:to>
+                                        <p:strVal val="visible"/>
+                                      </p:to>
+                                    </p:set>
+                                  </p:childTnLst>
+                                </p:cTn>
+                              </p:par>
+                              <p:par>
+                                <p:cTn id="27" presetID="1" presetClass="entr" presetSubtype="0" fill="hold" nodeType="withEffect">
+                                  <p:stCondLst>
+                                    <p:cond delay="11000"/>
+                                  </p:stCondLst>
+                                  <p:childTnLst>
+                                    <p:set>
+                                      <p:cBhvr>
+                                        <p:cTn id="28" dur="1" fill="hold">
+                                          <p:stCondLst>
+                                            <p:cond delay="0"/>
+                                          </p:stCondLst>
+                                        </p:cTn>
+                                        <p:tgtEl>
+                                          <p:spTgt spid="24"/>
+                                        </p:tgtEl>
+                                        <p:attrNameLst>
+                                          <p:attrName>style.visibility</p:attrName>
+                                        </p:attrNameLst>
+                                      </p:cBhvr>
+                                      <p:to>
+                                        <p:strVal val="visible"/>
+                                      </p:to>
+                                    </p:set>
+                                  </p:childTnLst>
+                                </p:cTn>
+                              </p:par>
+                              <p:par>
+                                <p:cTn id="29" presetID="1" presetClass="entr" presetSubtype="0" fill="hold" nodeType="withEffect">
+                                  <p:stCondLst>
+                                    <p:cond delay="12000"/>
+                                  </p:stCondLst>
+                                  <p:childTnLst>
+                                    <p:set>
+                                      <p:cBhvr>
+                                        <p:cTn id="30" dur="1" fill="hold">
+                                          <p:stCondLst>
+                                            <p:cond delay="0"/>
+                                          </p:stCondLst>
+                                        </p:cTn>
+                                        <p:tgtEl>
+                                          <p:spTgt spid="25"/>
+                                        </p:tgtEl>
+                                        <p:attrNameLst>
+                                          <p:attrName>style.visibility</p:attrName>
+                                        </p:attrNameLst>
+                                      </p:cBhvr>
+                                      <p:to>
+                                        <p:strVal val="visible"/>
+                                      </p:to>
+                                    </p:set>
+                                  </p:childTnLst>
+                                </p:cTn>
+                              </p:par>
+                              <p:par>
+                                <p:cTn id="31" presetID="1" presetClass="entr" presetSubtype="0" fill="hold" nodeType="withEffect">
+                                  <p:stCondLst>
+                                    <p:cond delay="14000"/>
+                                  </p:stCondLst>
+                                  <p:childTnLst>
+                                    <p:set>
+                                      <p:cBhvr>
+                                        <p:cTn id="32" dur="1" fill="hold">
+                                          <p:stCondLst>
+                                            <p:cond delay="0"/>
+                                          </p:stCondLst>
+                                        </p:cTn>
+                                        <p:tgtEl>
+                                          <p:spTgt spid="31"/>
+                                        </p:tgtEl>
+                                        <p:attrNameLst>
+                                          <p:attrName>style.visibility</p:attrName>
+                                        </p:attrNameLst>
+                                      </p:cBhvr>
+                                      <p:to>
+                                        <p:strVal val="visible"/>
+                                      </p:to>
+                                    </p:set>
+                                  </p:childTnLst>
+                                </p:cTn>
+                              </p:par>
+                              <p:par>
+                                <p:cTn id="33" presetID="0" presetClass="path" presetSubtype="0" repeatCount="1000000" accel="50000" decel="50000" fill="hold" nodeType="withEffect">
+                                  <p:stCondLst>
+                                    <p:cond delay="15000"/>
+                                  </p:stCondLst>
+                                  <p:childTnLst>
+                                    <p:animMotion origin="layout" path="M -0.00013 -0.00394 L 0.13542 -0.00394 " pathEditMode="relative" ptsTypes="AA">
+                                      <p:cBhvr>
+                                        <p:cTn id="34" dur="2000" fill="hold"/>
+                                        <p:tgtEl>
+                                          <p:spTgt spid="31"/>
+                                        </p:tgtEl>
+                                        <p:attrNameLst>
+                                          <p:attrName>ppt_x</p:attrName>
+                                          <p:attrName>ppt_y</p:attrName>
+                                        </p:attrNameLst>
+                                      </p:cBhvr>
+                                    </p:animMotion>
+                                  </p:childTnLst>
+                                </p:cTn>
+                              </p:par>
+                              <p:par>
+                                <p:cTn id="35" presetID="1" presetClass="entr" presetSubtype="0" fill="hold" nodeType="withEffect">
+                                  <p:stCondLst>
+                                    <p:cond delay="16000"/>
+                                  </p:stCondLst>
+                                  <p:childTnLst>
+                                    <p:set>
+                                      <p:cBhvr>
+                                        <p:cTn id="36" dur="1" fill="hold">
+                                          <p:stCondLst>
+                                            <p:cond delay="0"/>
+                                          </p:stCondLst>
+                                        </p:cTn>
+                                        <p:tgtEl>
+                                          <p:spTgt spid="37"/>
+                                        </p:tgtEl>
+                                        <p:attrNameLst>
+                                          <p:attrName>style.visibility</p:attrName>
+                                        </p:attrNameLst>
+                                      </p:cBhvr>
+                                      <p:to>
+                                        <p:strVal val="visible"/>
+                                      </p:to>
+                                    </p:set>
+                                  </p:childTnLst>
+                                </p:cTn>
+                              </p:par>
+                              <p:par>
+                                <p:cTn id="37" presetID="0" presetClass="path" presetSubtype="0" repeatCount="1000000" accel="50000" decel="50000" fill="hold" nodeType="withEffect">
+                                  <p:stCondLst>
+                                    <p:cond delay="17000"/>
+                                  </p:stCondLst>
+                                  <p:childTnLst>
+                                    <p:animMotion origin="layout" path="M 4.58333E-6 4.07407E-6 C -0.00235 0.00949 -0.00469 0.01898 -0.00638 0.04051 C -0.00808 0.06203 -0.01042 0.09629 -0.01016 0.1287 C -0.01003 0.16111 -0.00808 0.2074 -0.00508 0.23495 C -0.00209 0.26227 0.00768 0.29375 0.00768 0.29375 " pathEditMode="relative" ptsTypes="AAAAA">
+                                      <p:cBhvr>
+                                        <p:cTn id="38" dur="2000" fill="hold"/>
+                                        <p:tgtEl>
+                                          <p:spTgt spid="37"/>
+                                        </p:tgtEl>
+                                        <p:attrNameLst>
+                                          <p:attrName>ppt_x</p:attrName>
+                                          <p:attrName>ppt_y</p:attrName>
+                                        </p:attrNameLst>
+                                      </p:cBhvr>
+                                    </p:animMotion>
+                                  </p:childTnLst>
+                                </p:cTn>
+                              </p:par>
+                              <p:par>
+                                <p:cTn id="39" presetID="1" presetClass="entr" presetSubtype="0" fill="hold" nodeType="withEffect">
+                                  <p:stCondLst>
+                                    <p:cond delay="18000"/>
+                                  </p:stCondLst>
+                                  <p:childTnLst>
+                                    <p:set>
+                                      <p:cBhvr>
+                                        <p:cTn id="40" dur="1" fill="hold">
+                                          <p:stCondLst>
+                                            <p:cond delay="0"/>
+                                          </p:stCondLst>
+                                        </p:cTn>
+                                        <p:tgtEl>
+                                          <p:spTgt spid="43"/>
+                                        </p:tgtEl>
+                                        <p:attrNameLst>
+                                          <p:attrName>style.visibility</p:attrName>
+                                        </p:attrNameLst>
+                                      </p:cBhvr>
+                                      <p:to>
+                                        <p:strVal val="visible"/>
+                                      </p:to>
+                                    </p:set>
+                                  </p:childTnLst>
+                                </p:cTn>
+                              </p:par>
+                              <p:par>
+                                <p:cTn id="41" presetID="0" presetClass="path" presetSubtype="0" repeatCount="1000000" accel="50000" decel="50000" fill="hold" nodeType="withEffect">
+                                  <p:stCondLst>
+                                    <p:cond delay="20000"/>
+                                  </p:stCondLst>
+                                  <p:childTnLst>
+                                    <p:animMotion origin="layout" path="M -0.00169 -0.00648 L 0.18399 -0.00301 " pathEditMode="relative" ptsTypes="AA">
+                                      <p:cBhvr>
+                                        <p:cTn id="42" dur="10000" fill="hold"/>
+                                        <p:tgtEl>
+                                          <p:spTgt spid="43"/>
+                                        </p:tgtEl>
+                                        <p:attrNameLst>
+                                          <p:attrName>ppt_x</p:attrName>
+                                          <p:attrName>ppt_y</p:attrName>
+                                        </p:attrNameLst>
+                                      </p:cBhvr>
+                                    </p:animMotion>
+                                  </p:childTnLst>
+                                </p:cTn>
+                              </p:par>
+                            </p:childTnLst>
+                          </p:cTn>
+                        </p:par>
+                      </p:childTnLst>
+                    </p:cTn>
+                  </p:par>
+                </p:childTnLst>
+              </p:cTn>
+              <p:prevCondLst>
+                <p:cond evt="onPrev" delay="0">
+                  <p:tgtEl>
+                    <p:sldTgt/>
+                  </p:tgtEl>
+                </p:cond>
+              </p:prevCondLst>
+              <p:nextCondLst>
+                <p:cond evt="onNext" delay="0">
+                  <p:tgtEl>
+                    <p:sldTgt/>
+                  </p:tgtEl>
+                </p:cond>
+              </p:nextCondLst>
+            </p:seq>
+          </p:childTnLst>
+        </p:cTn>
+      </p:par>
+    </p:tnLst>
+    <p:bldLst>
+      <p:bldP spid="41" grpId="0"/>
+      <p:bldP spid="41" grpId="1"/>
+    </p:bldLst>
+  </p:timing>
+</p:sld>
+</file>
+
+<file path=ppt/slides/slide5.xml><?xml version="1.0" encoding="utf-8"?>
+<p:sld xmlns:a="http://schemas.openxmlformats.org/drawingml/2006/main" xmlns:r="http://schemas.openxmlformats.org/officeDocument/2006/relationships" xmlns:p="http://schemas.openxmlformats.org/presentationml/2006/main">
+  <p:cSld>
+    <p:spTree>
+      <p:nvGrpSpPr>
+        <p:cNvPr id="1" name=""/>
+        <p:cNvGrpSpPr/>
+        <p:nvPr/>
+      </p:nvGrpSpPr>
+      <p:grpSpPr>
+        <a:xfrm>
+          <a:off x="0" y="0"/>
+          <a:ext cx="0" cy="0"/>
+          <a:chOff x="0" y="0"/>
+          <a:chExt cx="0" cy="0"/>
+        </a:xfrm>
+      </p:grpSpPr>
+      <p:sp>
+        <p:nvSpPr>
+          <p:cNvPr id="4" name="Titre 1"/>
+          <p:cNvSpPr>
+            <a:spLocks noGrp="1"/>
+          </p:cNvSpPr>
+          <p:nvPr>
+            <p:ph type="title"/>
+          </p:nvPr>
+        </p:nvSpPr>
+        <p:spPr>
+          <a:xfrm>
+            <a:off x="0" y="2627877"/>
+            <a:ext cx="13699210" cy="1325563"/>
+          </a:xfrm>
+        </p:spPr>
+        <p:txBody>
+          <a:bodyPr>
+            <a:noAutofit/>
+          </a:bodyPr>
+          <a:lstStyle/>
+          <a:p>
+            <a:r>
+              <a:rPr lang="fr-FR" sz="6000" dirty="0" err="1" smtClean="0"/>
+              <a:t>Hypocalcemia</a:t>
+            </a:r>
+            <a:r>
+              <a:rPr lang="fr-FR" sz="6000" dirty="0" smtClean="0"/>
+              <a:t> </a:t>
+            </a:r>
+            <a:r>
+              <a:rPr lang="fr-FR" sz="6000" dirty="0" err="1" smtClean="0"/>
+              <a:t>stimulates</a:t>
+            </a:r>
+            <a:r>
+              <a:rPr lang="fr-FR" sz="6000" dirty="0" smtClean="0"/>
+              <a:t> PTH </a:t>
+            </a:r>
+            <a:r>
+              <a:rPr lang="fr-FR" sz="6000" dirty="0" err="1" smtClean="0"/>
+              <a:t>secretion</a:t>
+            </a:r>
+            <a:endParaRPr lang="fr-FR" sz="6000" dirty="0"/>
+          </a:p>
+        </p:txBody>
+      </p:sp>
+    </p:spTree>
+    <p:extLst>
+      <p:ext uri="{BB962C8B-B14F-4D97-AF65-F5344CB8AC3E}">
+        <p14:creationId xmlns:p14="http://schemas.microsoft.com/office/powerpoint/2010/main" val="1505634448"/>
+      </p:ext>
+    </p:extLst>
+  </p:cSld>
+  <p:clrMapOvr>
+    <a:masterClrMapping/>
+  </p:clrMapOvr>
+  <p:timing>
+    <p:tnLst>
+      <p:par>
+        <p:cTn id="1" dur="indefinite" restart="never" nodeType="tmRoot"/>
+      </p:par>
+    </p:tnLst>
+  </p:timing>
+</p:sld>
+</file>
+
+<file path=ppt/slides/slide6.xml><?xml version="1.0" encoding="utf-8"?>
+<p:sld xmlns:a="http://schemas.openxmlformats.org/drawingml/2006/main" xmlns:r="http://schemas.openxmlformats.org/officeDocument/2006/relationships" xmlns:p="http://schemas.openxmlformats.org/presentationml/2006/main">
+  <p:cSld>
+    <p:spTree>
+      <p:nvGrpSpPr>
+        <p:cNvPr id="1" name=""/>
+        <p:cNvGrpSpPr/>
+        <p:nvPr/>
+      </p:nvGrpSpPr>
+      <p:grpSpPr>
+        <a:xfrm>
+          <a:off x="0" y="0"/>
+          <a:ext cx="0" cy="0"/>
+          <a:chOff x="0" y="0"/>
+          <a:chExt cx="0" cy="0"/>
+        </a:xfrm>
+      </p:grpSpPr>
+      <p:pic>
+        <p:nvPicPr>
+          <p:cNvPr id="4" name="Image 3"/>
+          <p:cNvPicPr>
+            <a:picLocks noChangeAspect="1"/>
+          </p:cNvPicPr>
+          <p:nvPr/>
+        </p:nvPicPr>
+        <p:blipFill>
+          <a:blip r:embed="rId2">
+            <a:extLst>
+              <a:ext uri="{28A0092B-C50C-407E-A947-70E740481C1C}">
+                <a14:useLocalDpi xmlns:a14="http://schemas.microsoft.com/office/drawing/2010/main" val="0"/>
+              </a:ext>
+            </a:extLst>
+          </a:blip>
+          <a:stretch>
+            <a:fillRect/>
+          </a:stretch>
+        </p:blipFill>
+        <p:spPr>
+          <a:xfrm>
+            <a:off x="2281742" y="-16345"/>
+            <a:ext cx="7679317" cy="6858000"/>
+          </a:xfrm>
+          <a:prstGeom prst="rect">
+            <a:avLst/>
+          </a:prstGeom>
+        </p:spPr>
+      </p:pic>
+      <p:sp>
+        <p:nvSpPr>
+          <p:cNvPr id="5" name="Flèche vers la droite 4"/>
+          <p:cNvSpPr/>
+          <p:nvPr/>
+        </p:nvSpPr>
+        <p:spPr>
+          <a:xfrm>
+            <a:off x="5322417" y="2901026"/>
+            <a:ext cx="1175657" cy="511629"/>
+          </a:xfrm>
+          <a:prstGeom prst="rightArrow">
+            <a:avLst/>
+          </a:prstGeom>
+          <a:solidFill>
+            <a:schemeClr val="tx1"/>
+          </a:solidFill>
+          <a:ln>
+            <a:solidFill>
+              <a:schemeClr val="tx1"/>
+            </a:solidFill>
+          </a:ln>
+        </p:spPr>
+        <p:style>
+          <a:lnRef idx="2">
+            <a:schemeClr val="accent1">
+              <a:shade val="50000"/>
+            </a:schemeClr>
+          </a:lnRef>
+          <a:fillRef idx="1">
+            <a:schemeClr val="accent1"/>
+          </a:fillRef>
+          <a:effectRef idx="0">
+            <a:schemeClr val="accent1"/>
+          </a:effectRef>
+          <a:fontRef idx="minor">
+            <a:schemeClr val="lt1"/>
+          </a:fontRef>
+        </p:style>
+        <p:txBody>
+          <a:bodyPr rtlCol="0" anchor="ctr"/>
+          <a:lstStyle/>
+          <a:p>
+            <a:pPr algn="ctr"/>
+            <a:endParaRPr lang="fr-FR"/>
+          </a:p>
+        </p:txBody>
+      </p:sp>
+      <p:sp>
+        <p:nvSpPr>
+          <p:cNvPr id="6" name="Ellipse 5"/>
+          <p:cNvSpPr/>
+          <p:nvPr/>
+        </p:nvSpPr>
+        <p:spPr>
+          <a:xfrm>
+            <a:off x="6546562" y="2742438"/>
+            <a:ext cx="957942" cy="783770"/>
+          </a:xfrm>
+          <a:prstGeom prst="ellipse">
+            <a:avLst/>
+          </a:prstGeom>
+        </p:spPr>
+        <p:style>
+          <a:lnRef idx="2">
+            <a:schemeClr val="accent1">
+              <a:shade val="50000"/>
+            </a:schemeClr>
+          </a:lnRef>
+          <a:fillRef idx="1">
+            <a:schemeClr val="accent1"/>
+          </a:fillRef>
+          <a:effectRef idx="0">
+            <a:schemeClr val="accent1"/>
+          </a:effectRef>
+          <a:fontRef idx="minor">
+            <a:schemeClr val="lt1"/>
+          </a:fontRef>
+        </p:style>
+        <p:txBody>
+          <a:bodyPr rtlCol="0" anchor="ctr"/>
+          <a:lstStyle/>
+          <a:p>
+            <a:pPr algn="ctr"/>
+            <a:r>
+              <a:rPr lang="fr-FR" dirty="0" err="1" smtClean="0"/>
+              <a:t>PTHg</a:t>
+            </a:r>
+            <a:endParaRPr lang="fr-FR" dirty="0"/>
+          </a:p>
+        </p:txBody>
+      </p:sp>
+      <p:sp>
+        <p:nvSpPr>
+          <p:cNvPr id="7" name="Flèche vers la droite 6"/>
+          <p:cNvSpPr/>
+          <p:nvPr/>
+        </p:nvSpPr>
+        <p:spPr>
+          <a:xfrm>
+            <a:off x="7609030" y="2959381"/>
+            <a:ext cx="1522460" cy="518104"/>
+          </a:xfrm>
+          <a:prstGeom prst="rightArrow">
+            <a:avLst/>
+          </a:prstGeom>
+          <a:solidFill>
+            <a:schemeClr val="tx1"/>
+          </a:solidFill>
+          <a:ln>
+            <a:solidFill>
+              <a:schemeClr val="tx1"/>
+            </a:solidFill>
+          </a:ln>
+        </p:spPr>
+        <p:style>
+          <a:lnRef idx="2">
+            <a:schemeClr val="accent1">
+              <a:shade val="50000"/>
+            </a:schemeClr>
+          </a:lnRef>
+          <a:fillRef idx="1">
+            <a:schemeClr val="accent1"/>
+          </a:fillRef>
+          <a:effectRef idx="0">
+            <a:schemeClr val="accent1"/>
+          </a:effectRef>
+          <a:fontRef idx="minor">
+            <a:schemeClr val="lt1"/>
+          </a:fontRef>
+        </p:style>
+        <p:txBody>
+          <a:bodyPr rtlCol="0" anchor="ctr"/>
+          <a:lstStyle/>
+          <a:p>
+            <a:pPr algn="ctr"/>
+            <a:endParaRPr lang="fr-FR"/>
+          </a:p>
+        </p:txBody>
+      </p:sp>
+      <p:sp>
+        <p:nvSpPr>
+          <p:cNvPr id="8" name="Flèche vers la droite 7"/>
+          <p:cNvSpPr/>
+          <p:nvPr/>
+        </p:nvSpPr>
+        <p:spPr>
+          <a:xfrm rot="5400000">
+            <a:off x="6434265" y="3948824"/>
+            <a:ext cx="1182535" cy="511629"/>
+          </a:xfrm>
+          <a:prstGeom prst="rightArrow">
+            <a:avLst/>
+          </a:prstGeom>
+          <a:solidFill>
+            <a:schemeClr val="tx1"/>
+          </a:solidFill>
+          <a:ln>
+            <a:solidFill>
+              <a:schemeClr val="tx1"/>
+            </a:solidFill>
+          </a:ln>
+        </p:spPr>
+        <p:style>
+          <a:lnRef idx="2">
+            <a:schemeClr val="accent1">
+              <a:shade val="50000"/>
+            </a:schemeClr>
+          </a:lnRef>
+          <a:fillRef idx="1">
+            <a:schemeClr val="accent1"/>
+          </a:fillRef>
+          <a:effectRef idx="0">
+            <a:schemeClr val="accent1"/>
+          </a:effectRef>
+          <a:fontRef idx="minor">
+            <a:schemeClr val="lt1"/>
+          </a:fontRef>
+        </p:style>
+        <p:txBody>
+          <a:bodyPr rtlCol="0" anchor="ctr"/>
+          <a:lstStyle/>
+          <a:p>
+            <a:pPr algn="ctr"/>
+            <a:endParaRPr lang="fr-FR"/>
+          </a:p>
+        </p:txBody>
+      </p:sp>
+      <p:cxnSp>
+        <p:nvCxnSpPr>
+          <p:cNvPr id="9" name="Connecteur droit avec flèche 8"/>
+          <p:cNvCxnSpPr/>
+          <p:nvPr/>
+        </p:nvCxnSpPr>
+        <p:spPr>
+          <a:xfrm>
+            <a:off x="4648344" y="1012999"/>
+            <a:ext cx="1028876" cy="1912028"/>
+          </a:xfrm>
+          <a:prstGeom prst="straightConnector1">
+            <a:avLst/>
+          </a:prstGeom>
+          <a:ln w="63500">
+            <a:solidFill>
+              <a:schemeClr val="tx1"/>
+            </a:solidFill>
+            <a:prstDash val="dash"/>
+            <a:tailEnd type="triangle"/>
+          </a:ln>
+        </p:spPr>
+        <p:style>
+          <a:lnRef idx="1">
+            <a:schemeClr val="accent1"/>
+          </a:lnRef>
+          <a:fillRef idx="0">
+            <a:schemeClr val="accent1"/>
+          </a:fillRef>
+          <a:effectRef idx="0">
+            <a:schemeClr val="accent1"/>
+          </a:effectRef>
+          <a:fontRef idx="minor">
+            <a:schemeClr val="tx1"/>
+          </a:fontRef>
+        </p:style>
+      </p:cxnSp>
+      <p:cxnSp>
+        <p:nvCxnSpPr>
+          <p:cNvPr id="10" name="Connecteur droit avec flèche 9"/>
+          <p:cNvCxnSpPr/>
+          <p:nvPr/>
+        </p:nvCxnSpPr>
+        <p:spPr>
+          <a:xfrm>
+            <a:off x="7590449" y="1606628"/>
+            <a:ext cx="869561" cy="1424034"/>
+          </a:xfrm>
+          <a:prstGeom prst="straightConnector1">
+            <a:avLst/>
+          </a:prstGeom>
+          <a:ln w="63500">
+            <a:solidFill>
+              <a:srgbClr val="FFFF00"/>
+            </a:solidFill>
+            <a:prstDash val="dash"/>
+            <a:tailEnd type="triangle"/>
+          </a:ln>
+        </p:spPr>
+        <p:style>
+          <a:lnRef idx="1">
+            <a:schemeClr val="accent1"/>
+          </a:lnRef>
+          <a:fillRef idx="0">
+            <a:schemeClr val="accent1"/>
+          </a:fillRef>
+          <a:effectRef idx="0">
+            <a:schemeClr val="accent1"/>
+          </a:effectRef>
+          <a:fontRef idx="minor">
+            <a:schemeClr val="tx1"/>
+          </a:fontRef>
+        </p:style>
+      </p:cxnSp>
+      <p:pic>
+        <p:nvPicPr>
+          <p:cNvPr id="11" name="Image 10"/>
+          <p:cNvPicPr>
+            <a:picLocks noChangeAspect="1"/>
+          </p:cNvPicPr>
+          <p:nvPr/>
+        </p:nvPicPr>
+        <p:blipFill>
+          <a:blip r:embed="rId3">
+            <a:extLst>
+              <a:ext uri="{28A0092B-C50C-407E-A947-70E740481C1C}">
+                <a14:useLocalDpi xmlns:a14="http://schemas.microsoft.com/office/drawing/2010/main" val="0"/>
+              </a:ext>
+            </a:extLst>
+          </a:blip>
+          <a:stretch>
+            <a:fillRect/>
+          </a:stretch>
+        </p:blipFill>
+        <p:spPr>
+          <a:xfrm>
+            <a:off x="5706028" y="759543"/>
+            <a:ext cx="568567" cy="457198"/>
+          </a:xfrm>
+          <a:prstGeom prst="rect">
+            <a:avLst/>
+          </a:prstGeom>
+        </p:spPr>
+      </p:pic>
+      <p:pic>
+        <p:nvPicPr>
+          <p:cNvPr id="12" name="Image 11"/>
+          <p:cNvPicPr>
+            <a:picLocks noChangeAspect="1"/>
+          </p:cNvPicPr>
+          <p:nvPr/>
+        </p:nvPicPr>
+        <p:blipFill>
+          <a:blip r:embed="rId3">
+            <a:extLst>
+              <a:ext uri="{28A0092B-C50C-407E-A947-70E740481C1C}">
+                <a14:useLocalDpi xmlns:a14="http://schemas.microsoft.com/office/drawing/2010/main" val="0"/>
+              </a:ext>
+            </a:extLst>
+          </a:blip>
+          <a:stretch>
+            <a:fillRect/>
+          </a:stretch>
+        </p:blipFill>
+        <p:spPr>
+          <a:xfrm>
+            <a:off x="6121401" y="645244"/>
+            <a:ext cx="568567" cy="457198"/>
+          </a:xfrm>
+          <a:prstGeom prst="rect">
+            <a:avLst/>
+          </a:prstGeom>
+        </p:spPr>
+      </p:pic>
+      <p:sp>
+        <p:nvSpPr>
+          <p:cNvPr id="13" name="ZoneTexte 12"/>
+          <p:cNvSpPr txBox="1"/>
+          <p:nvPr/>
+        </p:nvSpPr>
+        <p:spPr>
+          <a:xfrm>
+            <a:off x="7210831" y="4035267"/>
+            <a:ext cx="1777072" cy="369332"/>
+          </a:xfrm>
+          <a:prstGeom prst="rect">
+            <a:avLst/>
+          </a:prstGeom>
+          <a:noFill/>
+        </p:spPr>
+        <p:txBody>
+          <a:bodyPr wrap="square" rtlCol="0">
+            <a:spAutoFit/>
+          </a:bodyPr>
+          <a:lstStyle/>
+          <a:p>
+            <a:r>
+              <a:rPr lang="fr-FR" smtClean="0"/>
+              <a:t>degradation</a:t>
+            </a:r>
+            <a:endParaRPr lang="fr-FR" dirty="0"/>
+          </a:p>
+        </p:txBody>
+      </p:sp>
+      <p:sp>
+        <p:nvSpPr>
+          <p:cNvPr id="14" name="ZoneTexte 13"/>
+          <p:cNvSpPr txBox="1"/>
+          <p:nvPr/>
+        </p:nvSpPr>
+        <p:spPr>
+          <a:xfrm>
+            <a:off x="5357251" y="3380167"/>
+            <a:ext cx="1777072" cy="369332"/>
+          </a:xfrm>
+          <a:prstGeom prst="rect">
+            <a:avLst/>
+          </a:prstGeom>
+          <a:noFill/>
+        </p:spPr>
+        <p:txBody>
+          <a:bodyPr wrap="square" rtlCol="0">
+            <a:spAutoFit/>
+          </a:bodyPr>
+          <a:lstStyle/>
+          <a:p>
+            <a:r>
+              <a:rPr lang="fr-FR" dirty="0" err="1" smtClean="0"/>
+              <a:t>synthesis</a:t>
+            </a:r>
+            <a:endParaRPr lang="fr-FR" dirty="0"/>
+          </a:p>
+        </p:txBody>
+      </p:sp>
+      <p:pic>
+        <p:nvPicPr>
+          <p:cNvPr id="17" name="Image 16"/>
+          <p:cNvPicPr>
+            <a:picLocks noChangeAspect="1"/>
+          </p:cNvPicPr>
+          <p:nvPr/>
+        </p:nvPicPr>
+        <p:blipFill>
+          <a:blip r:embed="rId4">
+            <a:extLst>
+              <a:ext uri="{28A0092B-C50C-407E-A947-70E740481C1C}">
+                <a14:useLocalDpi xmlns:a14="http://schemas.microsoft.com/office/drawing/2010/main" val="0"/>
+              </a:ext>
+            </a:extLst>
+          </a:blip>
+          <a:stretch>
+            <a:fillRect/>
+          </a:stretch>
+        </p:blipFill>
+        <p:spPr>
+          <a:xfrm>
+            <a:off x="7586535" y="1035100"/>
+            <a:ext cx="609600" cy="520700"/>
+          </a:xfrm>
+          <a:prstGeom prst="rect">
+            <a:avLst/>
+          </a:prstGeom>
+        </p:spPr>
+      </p:pic>
+      <p:sp>
+        <p:nvSpPr>
+          <p:cNvPr id="18" name="ZoneTexte 17"/>
+          <p:cNvSpPr txBox="1"/>
+          <p:nvPr/>
+        </p:nvSpPr>
+        <p:spPr>
+          <a:xfrm>
+            <a:off x="9650867" y="3140139"/>
+            <a:ext cx="1777072" cy="369332"/>
+          </a:xfrm>
+          <a:prstGeom prst="rect">
+            <a:avLst/>
+          </a:prstGeom>
+          <a:noFill/>
+        </p:spPr>
+        <p:txBody>
+          <a:bodyPr wrap="square" rtlCol="0">
+            <a:spAutoFit/>
+          </a:bodyPr>
+          <a:lstStyle/>
+          <a:p>
+            <a:r>
+              <a:rPr lang="fr-FR" smtClean="0"/>
+              <a:t>exocytosis</a:t>
+            </a:r>
+            <a:endParaRPr lang="fr-FR" dirty="0"/>
+          </a:p>
+        </p:txBody>
+      </p:sp>
+      <p:sp>
+        <p:nvSpPr>
+          <p:cNvPr id="19" name="Rectangle 18"/>
+          <p:cNvSpPr/>
+          <p:nvPr/>
+        </p:nvSpPr>
+        <p:spPr>
+          <a:xfrm>
+            <a:off x="8840602" y="4306529"/>
+            <a:ext cx="3070009" cy="1015015"/>
+          </a:xfrm>
+          <a:prstGeom prst="rect">
+            <a:avLst/>
+          </a:prstGeom>
+        </p:spPr>
+        <p:style>
+          <a:lnRef idx="2">
+            <a:schemeClr val="accent1">
+              <a:shade val="50000"/>
+            </a:schemeClr>
+          </a:lnRef>
+          <a:fillRef idx="1">
+            <a:schemeClr val="accent1"/>
+          </a:fillRef>
+          <a:effectRef idx="0">
+            <a:schemeClr val="accent1"/>
+          </a:effectRef>
+          <a:fontRef idx="minor">
+            <a:schemeClr val="lt1"/>
+          </a:fontRef>
+        </p:style>
+        <p:txBody>
+          <a:bodyPr rtlCol="0" anchor="ctr"/>
+          <a:lstStyle/>
+          <a:p>
+            <a:pPr algn="ctr"/>
+            <a:r>
+              <a:rPr lang="fr-FR" dirty="0" err="1" smtClean="0"/>
+              <a:t>Hypocalcemia</a:t>
+            </a:r>
+            <a:r>
+              <a:rPr lang="fr-FR" dirty="0" smtClean="0"/>
+              <a:t> </a:t>
+            </a:r>
+            <a:r>
+              <a:rPr lang="fr-FR" dirty="0" err="1" smtClean="0"/>
+              <a:t>increases</a:t>
+            </a:r>
+            <a:r>
+              <a:rPr lang="fr-FR" dirty="0" smtClean="0"/>
+              <a:t> PTH </a:t>
+            </a:r>
+            <a:r>
+              <a:rPr lang="fr-FR" dirty="0" err="1" smtClean="0"/>
+              <a:t>secretion</a:t>
+            </a:r>
+            <a:endParaRPr lang="fr-FR" dirty="0"/>
+          </a:p>
+        </p:txBody>
+      </p:sp>
+      <p:cxnSp>
+        <p:nvCxnSpPr>
+          <p:cNvPr id="20" name="Connecteur droit avec flèche 19"/>
+          <p:cNvCxnSpPr/>
+          <p:nvPr/>
+        </p:nvCxnSpPr>
+        <p:spPr>
+          <a:xfrm flipH="1">
+            <a:off x="5997015" y="1099713"/>
+            <a:ext cx="248772" cy="1847011"/>
+          </a:xfrm>
+          <a:prstGeom prst="straightConnector1">
+            <a:avLst/>
+          </a:prstGeom>
+          <a:ln w="63500">
+            <a:solidFill>
+              <a:schemeClr val="tx1"/>
+            </a:solidFill>
+            <a:prstDash val="dash"/>
+            <a:tailEnd type="triangle"/>
+          </a:ln>
+        </p:spPr>
+        <p:style>
+          <a:lnRef idx="1">
+            <a:schemeClr val="accent1"/>
+          </a:lnRef>
+          <a:fillRef idx="0">
+            <a:schemeClr val="accent1"/>
+          </a:fillRef>
+          <a:effectRef idx="0">
+            <a:schemeClr val="accent1"/>
+          </a:effectRef>
+          <a:fontRef idx="minor">
+            <a:schemeClr val="tx1"/>
+          </a:fontRef>
+        </p:style>
+      </p:cxnSp>
+      <p:pic>
+        <p:nvPicPr>
+          <p:cNvPr id="21" name="Image 20"/>
+          <p:cNvPicPr>
+            <a:picLocks noChangeAspect="1"/>
+          </p:cNvPicPr>
+          <p:nvPr/>
+        </p:nvPicPr>
+        <p:blipFill>
+          <a:blip r:embed="rId5">
+            <a:extLst>
+              <a:ext uri="{28A0092B-C50C-407E-A947-70E740481C1C}">
+                <a14:useLocalDpi xmlns:a14="http://schemas.microsoft.com/office/drawing/2010/main" val="0"/>
+              </a:ext>
+            </a:extLst>
+          </a:blip>
+          <a:stretch>
+            <a:fillRect/>
+          </a:stretch>
+        </p:blipFill>
+        <p:spPr>
+          <a:xfrm>
+            <a:off x="5168554" y="2919960"/>
+            <a:ext cx="500796" cy="484208"/>
+          </a:xfrm>
+          <a:prstGeom prst="rect">
+            <a:avLst/>
+          </a:prstGeom>
+        </p:spPr>
+      </p:pic>
+      <p:pic>
+        <p:nvPicPr>
+          <p:cNvPr id="23" name="Image 22"/>
+          <p:cNvPicPr>
+            <a:picLocks noChangeAspect="1"/>
+          </p:cNvPicPr>
+          <p:nvPr/>
+        </p:nvPicPr>
+        <p:blipFill>
+          <a:blip r:embed="rId4">
+            <a:extLst>
+              <a:ext uri="{28A0092B-C50C-407E-A947-70E740481C1C}">
+                <a14:useLocalDpi xmlns:a14="http://schemas.microsoft.com/office/drawing/2010/main" val="0"/>
+              </a:ext>
+            </a:extLst>
+          </a:blip>
+          <a:stretch>
+            <a:fillRect/>
+          </a:stretch>
+        </p:blipFill>
+        <p:spPr>
+          <a:xfrm>
+            <a:off x="8975814" y="774750"/>
+            <a:ext cx="609600" cy="520700"/>
+          </a:xfrm>
+          <a:prstGeom prst="rect">
+            <a:avLst/>
+          </a:prstGeom>
+        </p:spPr>
+      </p:pic>
+      <p:pic>
+        <p:nvPicPr>
+          <p:cNvPr id="24" name="Image 23"/>
+          <p:cNvPicPr>
+            <a:picLocks noChangeAspect="1"/>
+          </p:cNvPicPr>
+          <p:nvPr/>
+        </p:nvPicPr>
+        <p:blipFill>
+          <a:blip r:embed="rId3">
+            <a:extLst>
+              <a:ext uri="{28A0092B-C50C-407E-A947-70E740481C1C}">
+                <a14:useLocalDpi xmlns:a14="http://schemas.microsoft.com/office/drawing/2010/main" val="0"/>
+              </a:ext>
+            </a:extLst>
+          </a:blip>
+          <a:stretch>
+            <a:fillRect/>
+          </a:stretch>
+        </p:blipFill>
+        <p:spPr>
+          <a:xfrm>
+            <a:off x="8883500" y="-22564"/>
+            <a:ext cx="568567" cy="457198"/>
+          </a:xfrm>
+          <a:prstGeom prst="rect">
+            <a:avLst/>
+          </a:prstGeom>
+        </p:spPr>
+      </p:pic>
+      <p:sp>
+        <p:nvSpPr>
+          <p:cNvPr id="29" name="ZoneTexte 28"/>
+          <p:cNvSpPr txBox="1"/>
+          <p:nvPr/>
+        </p:nvSpPr>
+        <p:spPr>
+          <a:xfrm>
+            <a:off x="9646488" y="829097"/>
+            <a:ext cx="2488823" cy="523220"/>
+          </a:xfrm>
+          <a:prstGeom prst="rect">
+            <a:avLst/>
+          </a:prstGeom>
+          <a:noFill/>
+        </p:spPr>
+        <p:txBody>
+          <a:bodyPr wrap="square" rtlCol="0">
+            <a:spAutoFit/>
+          </a:bodyPr>
+          <a:lstStyle/>
+          <a:p>
+            <a:r>
+              <a:rPr lang="fr-FR" sz="2800" b="1" dirty="0" err="1" smtClean="0">
+                <a:solidFill>
+                  <a:srgbClr val="FF0000"/>
+                </a:solidFill>
+              </a:rPr>
+              <a:t>hypocalcemia</a:t>
+            </a:r>
+            <a:endParaRPr lang="fr-FR" b="1" dirty="0">
+              <a:solidFill>
+                <a:srgbClr val="FF0000"/>
+              </a:solidFill>
+            </a:endParaRPr>
+          </a:p>
+        </p:txBody>
+      </p:sp>
+      <p:pic>
+        <p:nvPicPr>
+          <p:cNvPr id="30" name="Image 29"/>
+          <p:cNvPicPr>
+            <a:picLocks noChangeAspect="1"/>
+          </p:cNvPicPr>
+          <p:nvPr/>
+        </p:nvPicPr>
+        <p:blipFill>
+          <a:blip r:embed="rId5">
+            <a:extLst>
+              <a:ext uri="{28A0092B-C50C-407E-A947-70E740481C1C}">
+                <a14:useLocalDpi xmlns:a14="http://schemas.microsoft.com/office/drawing/2010/main" val="0"/>
+              </a:ext>
+            </a:extLst>
+          </a:blip>
+          <a:stretch>
+            <a:fillRect/>
+          </a:stretch>
+        </p:blipFill>
+        <p:spPr>
+          <a:xfrm>
+            <a:off x="10289323" y="2658922"/>
+            <a:ext cx="500796" cy="484208"/>
+          </a:xfrm>
+          <a:prstGeom prst="rect">
+            <a:avLst/>
+          </a:prstGeom>
+        </p:spPr>
+      </p:pic>
+      <p:pic>
+        <p:nvPicPr>
+          <p:cNvPr id="31" name="Image 30"/>
+          <p:cNvPicPr>
+            <a:picLocks noChangeAspect="1"/>
+          </p:cNvPicPr>
+          <p:nvPr/>
+        </p:nvPicPr>
+        <p:blipFill>
+          <a:blip r:embed="rId5">
+            <a:extLst>
+              <a:ext uri="{28A0092B-C50C-407E-A947-70E740481C1C}">
+                <a14:useLocalDpi xmlns:a14="http://schemas.microsoft.com/office/drawing/2010/main" val="0"/>
+              </a:ext>
+            </a:extLst>
+          </a:blip>
+          <a:stretch>
+            <a:fillRect/>
+          </a:stretch>
+        </p:blipFill>
+        <p:spPr>
+          <a:xfrm>
+            <a:off x="10820574" y="3030662"/>
+            <a:ext cx="500796" cy="484208"/>
+          </a:xfrm>
+          <a:prstGeom prst="rect">
+            <a:avLst/>
+          </a:prstGeom>
+        </p:spPr>
+      </p:pic>
+      <p:pic>
+        <p:nvPicPr>
+          <p:cNvPr id="32" name="Image 31"/>
+          <p:cNvPicPr>
+            <a:picLocks noChangeAspect="1"/>
+          </p:cNvPicPr>
+          <p:nvPr/>
+        </p:nvPicPr>
+        <p:blipFill>
+          <a:blip r:embed="rId5">
+            <a:extLst>
+              <a:ext uri="{28A0092B-C50C-407E-A947-70E740481C1C}">
+                <a14:useLocalDpi xmlns:a14="http://schemas.microsoft.com/office/drawing/2010/main" val="0"/>
+              </a:ext>
+            </a:extLst>
+          </a:blip>
+          <a:stretch>
+            <a:fillRect/>
+          </a:stretch>
+        </p:blipFill>
+        <p:spPr>
+          <a:xfrm>
+            <a:off x="10811860" y="2558886"/>
+            <a:ext cx="500796" cy="484208"/>
+          </a:xfrm>
+          <a:prstGeom prst="rect">
+            <a:avLst/>
+          </a:prstGeom>
+        </p:spPr>
+      </p:pic>
+      <p:pic>
+        <p:nvPicPr>
+          <p:cNvPr id="33" name="Image 32"/>
+          <p:cNvPicPr>
+            <a:picLocks noChangeAspect="1"/>
+          </p:cNvPicPr>
+          <p:nvPr/>
+        </p:nvPicPr>
+        <p:blipFill>
+          <a:blip r:embed="rId5">
+            <a:extLst>
+              <a:ext uri="{28A0092B-C50C-407E-A947-70E740481C1C}">
+                <a14:useLocalDpi xmlns:a14="http://schemas.microsoft.com/office/drawing/2010/main" val="0"/>
+              </a:ext>
+            </a:extLst>
+          </a:blip>
+          <a:stretch>
+            <a:fillRect/>
+          </a:stretch>
+        </p:blipFill>
+        <p:spPr>
+          <a:xfrm>
+            <a:off x="9804672" y="2704620"/>
+            <a:ext cx="500796" cy="484208"/>
+          </a:xfrm>
+          <a:prstGeom prst="rect">
+            <a:avLst/>
+          </a:prstGeom>
+        </p:spPr>
+      </p:pic>
+      <p:pic>
+        <p:nvPicPr>
+          <p:cNvPr id="34" name="Image 33"/>
+          <p:cNvPicPr>
+            <a:picLocks noChangeAspect="1"/>
+          </p:cNvPicPr>
+          <p:nvPr/>
+        </p:nvPicPr>
+        <p:blipFill>
+          <a:blip r:embed="rId5">
+            <a:extLst>
+              <a:ext uri="{28A0092B-C50C-407E-A947-70E740481C1C}">
+                <a14:useLocalDpi xmlns:a14="http://schemas.microsoft.com/office/drawing/2010/main" val="0"/>
+              </a:ext>
+            </a:extLst>
+          </a:blip>
+          <a:stretch>
+            <a:fillRect/>
+          </a:stretch>
+        </p:blipFill>
+        <p:spPr>
+          <a:xfrm>
+            <a:off x="10381709" y="3524311"/>
+            <a:ext cx="500796" cy="484208"/>
+          </a:xfrm>
+          <a:prstGeom prst="rect">
+            <a:avLst/>
+          </a:prstGeom>
+        </p:spPr>
+      </p:pic>
+      <p:pic>
+        <p:nvPicPr>
+          <p:cNvPr id="35" name="Image 34"/>
+          <p:cNvPicPr>
+            <a:picLocks noChangeAspect="1"/>
+          </p:cNvPicPr>
+          <p:nvPr/>
+        </p:nvPicPr>
+        <p:blipFill>
+          <a:blip r:embed="rId5">
+            <a:extLst>
+              <a:ext uri="{28A0092B-C50C-407E-A947-70E740481C1C}">
+                <a14:useLocalDpi xmlns:a14="http://schemas.microsoft.com/office/drawing/2010/main" val="0"/>
+              </a:ext>
+            </a:extLst>
+          </a:blip>
+          <a:stretch>
+            <a:fillRect/>
+          </a:stretch>
+        </p:blipFill>
+        <p:spPr>
+          <a:xfrm>
+            <a:off x="10927143" y="3538629"/>
+            <a:ext cx="500796" cy="484208"/>
+          </a:xfrm>
+          <a:prstGeom prst="rect">
+            <a:avLst/>
+          </a:prstGeom>
+        </p:spPr>
+      </p:pic>
+      <p:pic>
+        <p:nvPicPr>
+          <p:cNvPr id="36" name="Image 35"/>
+          <p:cNvPicPr>
+            <a:picLocks noChangeAspect="1"/>
+          </p:cNvPicPr>
+          <p:nvPr/>
+        </p:nvPicPr>
+        <p:blipFill>
+          <a:blip r:embed="rId5">
+            <a:extLst>
+              <a:ext uri="{28A0092B-C50C-407E-A947-70E740481C1C}">
+                <a14:useLocalDpi xmlns:a14="http://schemas.microsoft.com/office/drawing/2010/main" val="0"/>
+              </a:ext>
+            </a:extLst>
+          </a:blip>
+          <a:stretch>
+            <a:fillRect/>
+          </a:stretch>
+        </p:blipFill>
+        <p:spPr>
+          <a:xfrm>
+            <a:off x="6749515" y="2919960"/>
+            <a:ext cx="500796" cy="484208"/>
+          </a:xfrm>
+          <a:prstGeom prst="rect">
+            <a:avLst/>
+          </a:prstGeom>
+        </p:spPr>
+      </p:pic>
+      <p:pic>
+        <p:nvPicPr>
+          <p:cNvPr id="37" name="Image 36"/>
+          <p:cNvPicPr>
+            <a:picLocks noChangeAspect="1"/>
+          </p:cNvPicPr>
+          <p:nvPr/>
+        </p:nvPicPr>
+        <p:blipFill>
+          <a:blip r:embed="rId5">
+            <a:extLst>
+              <a:ext uri="{28A0092B-C50C-407E-A947-70E740481C1C}">
+                <a14:useLocalDpi xmlns:a14="http://schemas.microsoft.com/office/drawing/2010/main" val="0"/>
+              </a:ext>
+            </a:extLst>
+          </a:blip>
+          <a:stretch>
+            <a:fillRect/>
+          </a:stretch>
+        </p:blipFill>
+        <p:spPr>
+          <a:xfrm>
+            <a:off x="6764336" y="2903429"/>
+            <a:ext cx="500796" cy="484208"/>
+          </a:xfrm>
+          <a:prstGeom prst="rect">
+            <a:avLst/>
+          </a:prstGeom>
+        </p:spPr>
+      </p:pic>
+    </p:spTree>
+    <p:extLst>
+      <p:ext uri="{BB962C8B-B14F-4D97-AF65-F5344CB8AC3E}">
+        <p14:creationId xmlns:p14="http://schemas.microsoft.com/office/powerpoint/2010/main" val="1752581681"/>
+      </p:ext>
+    </p:extLst>
+  </p:cSld>
+  <p:clrMapOvr>
+    <a:masterClrMapping/>
+  </p:clrMapOvr>
+  <p:timing>
+    <p:tnLst>
+      <p:par>
+        <p:cTn id="1" dur="indefinite" restart="never" nodeType="tmRoot">
+          <p:childTnLst>
+            <p:seq concurrent="1" nextAc="seek">
+              <p:cTn id="2" dur="indefinite" nodeType="mainSeq">
+                <p:childTnLst>
+                  <p:par>
+                    <p:cTn id="3" fill="hold">
+                      <p:stCondLst>
+                        <p:cond delay="indefinite"/>
+                      </p:stCondLst>
+                      <p:childTnLst>
+                        <p:par>
+                          <p:cTn id="4" fill="hold">
+                            <p:stCondLst>
+                              <p:cond delay="0"/>
+                            </p:stCondLst>
+                            <p:childTnLst>
+                              <p:par>
+                                <p:cTn id="5" presetID="1" presetClass="entr" presetSubtype="0" fill="hold" grpId="0" nodeType="clickEffect">
+                                  <p:stCondLst>
+                                    <p:cond delay="0"/>
+                                  </p:stCondLst>
+                                  <p:childTnLst>
+                                    <p:set>
+                                      <p:cBhvr>
+                                        <p:cTn id="6" dur="1" fill="hold">
+                                          <p:stCondLst>
+                                            <p:cond delay="0"/>
+                                          </p:stCondLst>
+                                        </p:cTn>
+                                        <p:tgtEl>
+                                          <p:spTgt spid="29"/>
+                                        </p:tgtEl>
+                                        <p:attrNameLst>
+                                          <p:attrName>style.visibility</p:attrName>
+                                        </p:attrNameLst>
+                                      </p:cBhvr>
+                                      <p:to>
+                                        <p:strVal val="visible"/>
+                                      </p:to>
+                                    </p:set>
+                                  </p:childTnLst>
+                                </p:cTn>
+                              </p:par>
+                              <p:par>
+                                <p:cTn id="7" presetID="35" presetClass="emph" presetSubtype="0" repeatCount="1000000" fill="hold" grpId="1" nodeType="withEffect">
+                                  <p:stCondLst>
+                                    <p:cond delay="1000"/>
+                                  </p:stCondLst>
+                                  <p:childTnLst>
+                                    <p:anim calcmode="discrete" valueType="str">
+                                      <p:cBhvr>
+                                        <p:cTn id="8" dur="1000" fill="hold"/>
+                                        <p:tgtEl>
+                                          <p:spTgt spid="29"/>
+                                        </p:tgtEl>
+                                        <p:attrNameLst>
+                                          <p:attrName>style.visibility</p:attrName>
+                                        </p:attrNameLst>
+                                      </p:cBhvr>
+                                      <p:tavLst>
+                                        <p:tav tm="0">
+                                          <p:val>
+                                            <p:strVal val="hidden"/>
+                                          </p:val>
+                                        </p:tav>
+                                        <p:tav tm="50000">
+                                          <p:val>
+                                            <p:strVal val="visible"/>
+                                          </p:val>
+                                        </p:tav>
+                                      </p:tavLst>
+                                    </p:anim>
+                                  </p:childTnLst>
+                                </p:cTn>
+                              </p:par>
+                              <p:par>
+                                <p:cTn id="9" presetID="1" presetClass="entr" presetSubtype="0" fill="hold" nodeType="withEffect">
+                                  <p:stCondLst>
+                                    <p:cond delay="2000"/>
+                                  </p:stCondLst>
+                                  <p:childTnLst>
+                                    <p:set>
+                                      <p:cBhvr>
+                                        <p:cTn id="10" dur="1" fill="hold">
+                                          <p:stCondLst>
+                                            <p:cond delay="0"/>
+                                          </p:stCondLst>
+                                        </p:cTn>
+                                        <p:tgtEl>
+                                          <p:spTgt spid="23"/>
+                                        </p:tgtEl>
+                                        <p:attrNameLst>
+                                          <p:attrName>style.visibility</p:attrName>
+                                        </p:attrNameLst>
+                                      </p:cBhvr>
+                                      <p:to>
+                                        <p:strVal val="visible"/>
+                                      </p:to>
+                                    </p:set>
+                                  </p:childTnLst>
+                                </p:cTn>
+                              </p:par>
+                              <p:par>
+                                <p:cTn id="11" presetID="0" presetClass="path" presetSubtype="0" repeatCount="1000000" accel="50000" decel="50000" fill="hold" nodeType="withEffect">
+                                  <p:stCondLst>
+                                    <p:cond delay="3000"/>
+                                  </p:stCondLst>
+                                  <p:childTnLst>
+                                    <p:animMotion origin="layout" path="M -2.08333E-6 -7.77778E-6 C -0.00573 0.01944 -0.01133 0.03911 -0.02292 0.04976 C -0.03464 0.06018 -0.05664 0.0662 -0.07005 0.06319 C -0.08333 0.06018 -0.10299 0.03148 -0.10299 0.03148 " pathEditMode="relative" ptsTypes="AAAA">
+                                      <p:cBhvr>
+                                        <p:cTn id="12" dur="5000" fill="hold"/>
+                                        <p:tgtEl>
+                                          <p:spTgt spid="23"/>
+                                        </p:tgtEl>
+                                        <p:attrNameLst>
+                                          <p:attrName>ppt_x</p:attrName>
+                                          <p:attrName>ppt_y</p:attrName>
+                                        </p:attrNameLst>
+                                      </p:cBhvr>
+                                    </p:animMotion>
+                                  </p:childTnLst>
+                                </p:cTn>
+                              </p:par>
+                              <p:par>
+                                <p:cTn id="13" presetID="1" presetClass="entr" presetSubtype="0" fill="hold" nodeType="withEffect">
+                                  <p:stCondLst>
+                                    <p:cond delay="8000"/>
+                                  </p:stCondLst>
+                                  <p:childTnLst>
+                                    <p:set>
+                                      <p:cBhvr>
+                                        <p:cTn id="14" dur="1" fill="hold">
+                                          <p:stCondLst>
+                                            <p:cond delay="0"/>
+                                          </p:stCondLst>
+                                        </p:cTn>
+                                        <p:tgtEl>
+                                          <p:spTgt spid="17"/>
+                                        </p:tgtEl>
+                                        <p:attrNameLst>
+                                          <p:attrName>style.visibility</p:attrName>
+                                        </p:attrNameLst>
+                                      </p:cBhvr>
+                                      <p:to>
+                                        <p:strVal val="visible"/>
+                                      </p:to>
+                                    </p:set>
+                                  </p:childTnLst>
+                                </p:cTn>
+                              </p:par>
+                              <p:par>
+                                <p:cTn id="15" presetID="1" presetClass="entr" presetSubtype="0" fill="hold" nodeType="withEffect">
+                                  <p:stCondLst>
+                                    <p:cond delay="9000"/>
+                                  </p:stCondLst>
+                                  <p:childTnLst>
+                                    <p:set>
+                                      <p:cBhvr>
+                                        <p:cTn id="16" dur="1" fill="hold">
+                                          <p:stCondLst>
+                                            <p:cond delay="0"/>
+                                          </p:stCondLst>
+                                        </p:cTn>
+                                        <p:tgtEl>
+                                          <p:spTgt spid="10"/>
+                                        </p:tgtEl>
+                                        <p:attrNameLst>
+                                          <p:attrName>style.visibility</p:attrName>
+                                        </p:attrNameLst>
+                                      </p:cBhvr>
+                                      <p:to>
+                                        <p:strVal val="visible"/>
+                                      </p:to>
+                                    </p:set>
+                                  </p:childTnLst>
+                                </p:cTn>
+                              </p:par>
+                              <p:par>
+                                <p:cTn id="17" presetID="35" presetClass="emph" presetSubtype="0" repeatCount="1000000" fill="hold" nodeType="withEffect">
+                                  <p:stCondLst>
+                                    <p:cond delay="10000"/>
+                                  </p:stCondLst>
+                                  <p:childTnLst>
+                                    <p:anim calcmode="discrete" valueType="str">
+                                      <p:cBhvr>
+                                        <p:cTn id="18" dur="1000" fill="hold"/>
+                                        <p:tgtEl>
+                                          <p:spTgt spid="10"/>
+                                        </p:tgtEl>
+                                        <p:attrNameLst>
+                                          <p:attrName>style.visibility</p:attrName>
+                                        </p:attrNameLst>
+                                      </p:cBhvr>
+                                      <p:tavLst>
+                                        <p:tav tm="0">
+                                          <p:val>
+                                            <p:strVal val="hidden"/>
+                                          </p:val>
+                                        </p:tav>
+                                        <p:tav tm="50000">
+                                          <p:val>
+                                            <p:strVal val="visible"/>
+                                          </p:val>
+                                        </p:tav>
+                                      </p:tavLst>
+                                    </p:anim>
+                                  </p:childTnLst>
+                                </p:cTn>
+                              </p:par>
+                              <p:par>
+                                <p:cTn id="19" presetID="1" presetClass="entr" presetSubtype="0" fill="hold" nodeType="withEffect">
+                                  <p:stCondLst>
+                                    <p:cond delay="11000"/>
+                                  </p:stCondLst>
+                                  <p:childTnLst>
+                                    <p:set>
+                                      <p:cBhvr>
+                                        <p:cTn id="20" dur="1" fill="hold">
+                                          <p:stCondLst>
+                                            <p:cond delay="0"/>
+                                          </p:stCondLst>
+                                        </p:cTn>
+                                        <p:tgtEl>
+                                          <p:spTgt spid="21"/>
+                                        </p:tgtEl>
+                                        <p:attrNameLst>
+                                          <p:attrName>style.visibility</p:attrName>
+                                        </p:attrNameLst>
+                                      </p:cBhvr>
+                                      <p:to>
+                                        <p:strVal val="visible"/>
+                                      </p:to>
+                                    </p:set>
+                                  </p:childTnLst>
+                                </p:cTn>
+                              </p:par>
+                              <p:par>
+                                <p:cTn id="21" presetID="0" presetClass="path" presetSubtype="0" repeatCount="1000000" accel="50000" decel="50000" fill="hold" nodeType="withEffect">
+                                  <p:stCondLst>
+                                    <p:cond delay="12000"/>
+                                  </p:stCondLst>
+                                  <p:childTnLst>
+                                    <p:animMotion origin="layout" path="M -0.00078 -0.00394 L 0.13373 -0.00255 " pathEditMode="relative" ptsTypes="AA">
+                                      <p:cBhvr>
+                                        <p:cTn id="22" dur="2000" fill="hold"/>
+                                        <p:tgtEl>
+                                          <p:spTgt spid="21"/>
+                                        </p:tgtEl>
+                                        <p:attrNameLst>
+                                          <p:attrName>ppt_x</p:attrName>
+                                          <p:attrName>ppt_y</p:attrName>
+                                        </p:attrNameLst>
+                                      </p:cBhvr>
+                                    </p:animMotion>
+                                  </p:childTnLst>
+                                </p:cTn>
+                              </p:par>
+                              <p:par>
+                                <p:cTn id="23" presetID="1" presetClass="entr" presetSubtype="0" fill="hold" nodeType="withEffect">
+                                  <p:stCondLst>
+                                    <p:cond delay="13000"/>
+                                  </p:stCondLst>
+                                  <p:childTnLst>
+                                    <p:set>
+                                      <p:cBhvr>
+                                        <p:cTn id="24" dur="1" fill="hold">
+                                          <p:stCondLst>
+                                            <p:cond delay="0"/>
+                                          </p:stCondLst>
+                                        </p:cTn>
+                                        <p:tgtEl>
+                                          <p:spTgt spid="36"/>
+                                        </p:tgtEl>
+                                        <p:attrNameLst>
+                                          <p:attrName>style.visibility</p:attrName>
+                                        </p:attrNameLst>
+                                      </p:cBhvr>
+                                      <p:to>
+                                        <p:strVal val="visible"/>
+                                      </p:to>
+                                    </p:set>
+                                  </p:childTnLst>
+                                </p:cTn>
+                              </p:par>
+                              <p:par>
+                                <p:cTn id="25" presetID="0" presetClass="path" presetSubtype="0" repeatCount="1000000" accel="50000" decel="50000" fill="hold" nodeType="withEffect">
+                                  <p:stCondLst>
+                                    <p:cond delay="14000"/>
+                                  </p:stCondLst>
+                                  <p:childTnLst>
+                                    <p:animMotion origin="layout" path="M 0.00091 -0.00648 L 0.00286 0.27593 " pathEditMode="relative" ptsTypes="AA">
+                                      <p:cBhvr>
+                                        <p:cTn id="26" dur="2000" fill="hold"/>
+                                        <p:tgtEl>
+                                          <p:spTgt spid="36"/>
+                                        </p:tgtEl>
+                                        <p:attrNameLst>
+                                          <p:attrName>ppt_x</p:attrName>
+                                          <p:attrName>ppt_y</p:attrName>
+                                        </p:attrNameLst>
+                                      </p:cBhvr>
+                                    </p:animMotion>
+                                  </p:childTnLst>
+                                </p:cTn>
+                              </p:par>
+                              <p:par>
+                                <p:cTn id="27" presetID="1" presetClass="entr" presetSubtype="0" fill="hold" nodeType="withEffect">
+                                  <p:stCondLst>
+                                    <p:cond delay="15000"/>
+                                  </p:stCondLst>
+                                  <p:childTnLst>
+                                    <p:set>
+                                      <p:cBhvr>
+                                        <p:cTn id="28" dur="1" fill="hold">
+                                          <p:stCondLst>
+                                            <p:cond delay="0"/>
+                                          </p:stCondLst>
+                                        </p:cTn>
+                                        <p:tgtEl>
+                                          <p:spTgt spid="37"/>
+                                        </p:tgtEl>
+                                        <p:attrNameLst>
+                                          <p:attrName>style.visibility</p:attrName>
+                                        </p:attrNameLst>
+                                      </p:cBhvr>
+                                      <p:to>
+                                        <p:strVal val="visible"/>
+                                      </p:to>
+                                    </p:set>
+                                  </p:childTnLst>
+                                </p:cTn>
+                              </p:par>
+                              <p:par>
+                                <p:cTn id="29" presetID="0" presetClass="path" presetSubtype="0" repeatCount="1000000" accel="50000" decel="50000" fill="hold" nodeType="withEffect">
+                                  <p:stCondLst>
+                                    <p:cond delay="16000"/>
+                                  </p:stCondLst>
+                                  <p:childTnLst>
+                                    <p:animMotion origin="layout" path="M -0.00026 -0.00416 L 0.2 -0.00185 " pathEditMode="relative" ptsTypes="AA">
+                                      <p:cBhvr>
+                                        <p:cTn id="30" dur="1000" fill="hold"/>
+                                        <p:tgtEl>
+                                          <p:spTgt spid="37"/>
+                                        </p:tgtEl>
+                                        <p:attrNameLst>
+                                          <p:attrName>ppt_x</p:attrName>
+                                          <p:attrName>ppt_y</p:attrName>
+                                        </p:attrNameLst>
+                                      </p:cBhvr>
+                                    </p:animMotion>
+                                  </p:childTnLst>
+                                </p:cTn>
+                              </p:par>
+                              <p:par>
+                                <p:cTn id="31" presetID="1" presetClass="entr" presetSubtype="0" fill="hold" nodeType="withEffect">
+                                  <p:stCondLst>
+                                    <p:cond delay="17000"/>
+                                  </p:stCondLst>
+                                  <p:childTnLst>
+                                    <p:set>
+                                      <p:cBhvr>
+                                        <p:cTn id="32" dur="1" fill="hold">
+                                          <p:stCondLst>
+                                            <p:cond delay="0"/>
+                                          </p:stCondLst>
+                                        </p:cTn>
+                                        <p:tgtEl>
+                                          <p:spTgt spid="33"/>
+                                        </p:tgtEl>
+                                        <p:attrNameLst>
+                                          <p:attrName>style.visibility</p:attrName>
+                                        </p:attrNameLst>
+                                      </p:cBhvr>
+                                      <p:to>
+                                        <p:strVal val="visible"/>
+                                      </p:to>
+                                    </p:set>
+                                  </p:childTnLst>
+                                </p:cTn>
+                              </p:par>
+                              <p:par>
+                                <p:cTn id="33" presetID="1" presetClass="entr" presetSubtype="0" fill="hold" nodeType="withEffect">
+                                  <p:stCondLst>
+                                    <p:cond delay="18000"/>
+                                  </p:stCondLst>
+                                  <p:childTnLst>
+                                    <p:set>
+                                      <p:cBhvr>
+                                        <p:cTn id="34" dur="1" fill="hold">
+                                          <p:stCondLst>
+                                            <p:cond delay="0"/>
+                                          </p:stCondLst>
+                                        </p:cTn>
+                                        <p:tgtEl>
+                                          <p:spTgt spid="30"/>
+                                        </p:tgtEl>
+                                        <p:attrNameLst>
+                                          <p:attrName>style.visibility</p:attrName>
+                                        </p:attrNameLst>
+                                      </p:cBhvr>
+                                      <p:to>
+                                        <p:strVal val="visible"/>
+                                      </p:to>
+                                    </p:set>
+                                  </p:childTnLst>
+                                </p:cTn>
+                              </p:par>
+                              <p:par>
+                                <p:cTn id="35" presetID="1" presetClass="entr" presetSubtype="0" fill="hold" nodeType="withEffect">
+                                  <p:stCondLst>
+                                    <p:cond delay="19000"/>
+                                  </p:stCondLst>
+                                  <p:childTnLst>
+                                    <p:set>
+                                      <p:cBhvr>
+                                        <p:cTn id="36" dur="1" fill="hold">
+                                          <p:stCondLst>
+                                            <p:cond delay="0"/>
+                                          </p:stCondLst>
+                                        </p:cTn>
+                                        <p:tgtEl>
+                                          <p:spTgt spid="32"/>
+                                        </p:tgtEl>
+                                        <p:attrNameLst>
+                                          <p:attrName>style.visibility</p:attrName>
+                                        </p:attrNameLst>
+                                      </p:cBhvr>
+                                      <p:to>
+                                        <p:strVal val="visible"/>
+                                      </p:to>
+                                    </p:set>
+                                  </p:childTnLst>
+                                </p:cTn>
+                              </p:par>
+                              <p:par>
+                                <p:cTn id="37" presetID="1" presetClass="entr" presetSubtype="0" fill="hold" nodeType="withEffect">
+                                  <p:stCondLst>
+                                    <p:cond delay="20000"/>
+                                  </p:stCondLst>
+                                  <p:childTnLst>
+                                    <p:set>
+                                      <p:cBhvr>
+                                        <p:cTn id="38" dur="1" fill="hold">
+                                          <p:stCondLst>
+                                            <p:cond delay="0"/>
+                                          </p:stCondLst>
+                                        </p:cTn>
+                                        <p:tgtEl>
+                                          <p:spTgt spid="31"/>
+                                        </p:tgtEl>
+                                        <p:attrNameLst>
+                                          <p:attrName>style.visibility</p:attrName>
+                                        </p:attrNameLst>
+                                      </p:cBhvr>
+                                      <p:to>
+                                        <p:strVal val="visible"/>
+                                      </p:to>
+                                    </p:set>
+                                  </p:childTnLst>
+                                </p:cTn>
+                              </p:par>
+                              <p:par>
+                                <p:cTn id="39" presetID="1" presetClass="entr" presetSubtype="0" fill="hold" nodeType="withEffect">
+                                  <p:stCondLst>
+                                    <p:cond delay="21000"/>
+                                  </p:stCondLst>
+                                  <p:childTnLst>
+                                    <p:set>
+                                      <p:cBhvr>
+                                        <p:cTn id="40" dur="1" fill="hold">
+                                          <p:stCondLst>
+                                            <p:cond delay="0"/>
+                                          </p:stCondLst>
+                                        </p:cTn>
+                                        <p:tgtEl>
+                                          <p:spTgt spid="34"/>
+                                        </p:tgtEl>
+                                        <p:attrNameLst>
+                                          <p:attrName>style.visibility</p:attrName>
+                                        </p:attrNameLst>
+                                      </p:cBhvr>
+                                      <p:to>
+                                        <p:strVal val="visible"/>
+                                      </p:to>
+                                    </p:set>
+                                  </p:childTnLst>
+                                </p:cTn>
+                              </p:par>
+                              <p:par>
+                                <p:cTn id="41" presetID="1" presetClass="entr" presetSubtype="0" fill="hold" nodeType="withEffect">
+                                  <p:stCondLst>
+                                    <p:cond delay="22000"/>
+                                  </p:stCondLst>
+                                  <p:childTnLst>
+                                    <p:set>
+                                      <p:cBhvr>
+                                        <p:cTn id="42" dur="1" fill="hold">
+                                          <p:stCondLst>
+                                            <p:cond delay="0"/>
+                                          </p:stCondLst>
+                                        </p:cTn>
+                                        <p:tgtEl>
+                                          <p:spTgt spid="35"/>
+                                        </p:tgtEl>
+                                        <p:attrNameLst>
+                                          <p:attrName>style.visibility</p:attrName>
+                                        </p:attrNameLst>
+                                      </p:cBhvr>
+                                      <p:to>
+                                        <p:strVal val="visible"/>
+                                      </p:to>
+                                    </p:set>
+                                  </p:childTnLst>
+                                </p:cTn>
+                              </p:par>
+                            </p:childTnLst>
+                          </p:cTn>
+                        </p:par>
+                      </p:childTnLst>
+                    </p:cTn>
+                  </p:par>
+                </p:childTnLst>
+              </p:cTn>
+              <p:prevCondLst>
+                <p:cond evt="onPrev" delay="0">
+                  <p:tgtEl>
+                    <p:sldTgt/>
+                  </p:tgtEl>
+                </p:cond>
+              </p:prevCondLst>
+              <p:nextCondLst>
+                <p:cond evt="onNext" delay="0">
+                  <p:tgtEl>
+                    <p:sldTgt/>
+                  </p:tgtEl>
+                </p:cond>
+              </p:nextCondLst>
+            </p:seq>
+          </p:childTnLst>
+        </p:cTn>
+      </p:par>
+    </p:tnLst>
+    <p:bldLst>
+      <p:bldP spid="29" grpId="0"/>
+      <p:bldP spid="29" grpId="1"/>
     </p:bldLst>
   </p:timing>
 </p:sld>

</xml_diff>